<commit_message>
✨  add pview com
</commit_message>
<xml_diff>
--- a/src/assets/files/1.pptx
+++ b/src/assets/files/1.pptx
@@ -1,19 +1,22 @@
 
 <file path=ppt/presentation.xml><?xml version="1.0" encoding="utf-8"?>
-<p:presentation xmlns:a="http://schemas.openxmlformats.org/drawingml/2006/main" xmlns:r="http://schemas.openxmlformats.org/officeDocument/2006/relationships" xmlns:p="http://schemas.openxmlformats.org/presentationml/2006/main">
+<p:presentation xmlns:a="http://schemas.openxmlformats.org/drawingml/2006/main" xmlns:r="http://schemas.openxmlformats.org/officeDocument/2006/relationships" xmlns:p="http://schemas.openxmlformats.org/presentationml/2006/main" saveSubsetFonts="1">
   <p:sldMasterIdLst>
-    <p:sldMasterId id="2147483648" r:id="rId1"/>
+    <p:sldMasterId id="2147483660" r:id="rId1"/>
   </p:sldMasterIdLst>
   <p:sldIdLst>
-    <p:sldId id="256" r:id="rId3"/>
+    <p:sldId id="256" r:id="rId2"/>
+    <p:sldId id="257" r:id="rId3"/>
+    <p:sldId id="258" r:id="rId4"/>
   </p:sldIdLst>
   <p:sldSz cx="12192000" cy="6858000"/>
   <p:notesSz cx="6858000" cy="9144000"/>
+  <p:photoAlbum/>
   <p:defaultTextStyle>
     <a:defPPr>
-      <a:defRPr lang="zh-CN"/>
+      <a:defRPr lang="en-US"/>
     </a:defPPr>
-    <a:lvl1pPr marL="0" algn="l" defTabSz="914400" rtl="0" eaLnBrk="1" latinLnBrk="0" hangingPunct="1">
+    <a:lvl1pPr marL="0" algn="l" defTabSz="457200" rtl="0" eaLnBrk="1" latinLnBrk="0" hangingPunct="1">
       <a:defRPr sz="1800" kern="1200">
         <a:solidFill>
           <a:schemeClr val="tx1"/>
@@ -23,7 +26,7 @@
         <a:cs typeface="+mn-cs"/>
       </a:defRPr>
     </a:lvl1pPr>
-    <a:lvl2pPr marL="457200" algn="l" defTabSz="914400" rtl="0" eaLnBrk="1" latinLnBrk="0" hangingPunct="1">
+    <a:lvl2pPr marL="457200" algn="l" defTabSz="457200" rtl="0" eaLnBrk="1" latinLnBrk="0" hangingPunct="1">
       <a:defRPr sz="1800" kern="1200">
         <a:solidFill>
           <a:schemeClr val="tx1"/>
@@ -33,7 +36,7 @@
         <a:cs typeface="+mn-cs"/>
       </a:defRPr>
     </a:lvl2pPr>
-    <a:lvl3pPr marL="914400" algn="l" defTabSz="914400" rtl="0" eaLnBrk="1" latinLnBrk="0" hangingPunct="1">
+    <a:lvl3pPr marL="914400" algn="l" defTabSz="457200" rtl="0" eaLnBrk="1" latinLnBrk="0" hangingPunct="1">
       <a:defRPr sz="1800" kern="1200">
         <a:solidFill>
           <a:schemeClr val="tx1"/>
@@ -43,7 +46,7 @@
         <a:cs typeface="+mn-cs"/>
       </a:defRPr>
     </a:lvl3pPr>
-    <a:lvl4pPr marL="1371600" algn="l" defTabSz="914400" rtl="0" eaLnBrk="1" latinLnBrk="0" hangingPunct="1">
+    <a:lvl4pPr marL="1371600" algn="l" defTabSz="457200" rtl="0" eaLnBrk="1" latinLnBrk="0" hangingPunct="1">
       <a:defRPr sz="1800" kern="1200">
         <a:solidFill>
           <a:schemeClr val="tx1"/>
@@ -53,7 +56,7 @@
         <a:cs typeface="+mn-cs"/>
       </a:defRPr>
     </a:lvl4pPr>
-    <a:lvl5pPr marL="1828800" algn="l" defTabSz="914400" rtl="0" eaLnBrk="1" latinLnBrk="0" hangingPunct="1">
+    <a:lvl5pPr marL="1828800" algn="l" defTabSz="457200" rtl="0" eaLnBrk="1" latinLnBrk="0" hangingPunct="1">
       <a:defRPr sz="1800" kern="1200">
         <a:solidFill>
           <a:schemeClr val="tx1"/>
@@ -63,7 +66,7 @@
         <a:cs typeface="+mn-cs"/>
       </a:defRPr>
     </a:lvl5pPr>
-    <a:lvl6pPr marL="2286000" algn="l" defTabSz="914400" rtl="0" eaLnBrk="1" latinLnBrk="0" hangingPunct="1">
+    <a:lvl6pPr marL="2286000" algn="l" defTabSz="457200" rtl="0" eaLnBrk="1" latinLnBrk="0" hangingPunct="1">
       <a:defRPr sz="1800" kern="1200">
         <a:solidFill>
           <a:schemeClr val="tx1"/>
@@ -73,7 +76,7 @@
         <a:cs typeface="+mn-cs"/>
       </a:defRPr>
     </a:lvl6pPr>
-    <a:lvl7pPr marL="2743200" algn="l" defTabSz="914400" rtl="0" eaLnBrk="1" latinLnBrk="0" hangingPunct="1">
+    <a:lvl7pPr marL="2743200" algn="l" defTabSz="457200" rtl="0" eaLnBrk="1" latinLnBrk="0" hangingPunct="1">
       <a:defRPr sz="1800" kern="1200">
         <a:solidFill>
           <a:schemeClr val="tx1"/>
@@ -83,7 +86,7 @@
         <a:cs typeface="+mn-cs"/>
       </a:defRPr>
     </a:lvl7pPr>
-    <a:lvl8pPr marL="3200400" algn="l" defTabSz="914400" rtl="0" eaLnBrk="1" latinLnBrk="0" hangingPunct="1">
+    <a:lvl8pPr marL="3200400" algn="l" defTabSz="457200" rtl="0" eaLnBrk="1" latinLnBrk="0" hangingPunct="1">
       <a:defRPr sz="1800" kern="1200">
         <a:solidFill>
           <a:schemeClr val="tx1"/>
@@ -93,7 +96,7 @@
         <a:cs typeface="+mn-cs"/>
       </a:defRPr>
     </a:lvl8pPr>
-    <a:lvl9pPr marL="3657600" algn="l" defTabSz="914400" rtl="0" eaLnBrk="1" latinLnBrk="0" hangingPunct="1">
+    <a:lvl9pPr marL="3657600" algn="l" defTabSz="457200" rtl="0" eaLnBrk="1" latinLnBrk="0" hangingPunct="1">
       <a:defRPr sz="1800" kern="1200">
         <a:solidFill>
           <a:schemeClr val="tx1"/>
@@ -126,7 +129,7 @@
       </p:grpSpPr>
       <p:sp>
         <p:nvSpPr>
-          <p:cNvPr id="2" name="标题 1"/>
+          <p:cNvPr id="2" name="Title 1"/>
           <p:cNvSpPr>
             <a:spLocks noGrp="1"/>
           </p:cNvSpPr>
@@ -136,29 +139,31 @@
         </p:nvSpPr>
         <p:spPr>
           <a:xfrm>
-            <a:off x="1524000" y="1122363"/>
-            <a:ext cx="9144000" cy="2387600"/>
-          </a:xfrm>
-        </p:spPr>
-        <p:txBody>
-          <a:bodyPr anchor="b"/>
+            <a:off x="2417779" y="802298"/>
+            <a:ext cx="8637073" cy="2541431"/>
+          </a:xfrm>
+        </p:spPr>
+        <p:txBody>
+          <a:bodyPr bIns="0" anchor="b">
+            <a:normAutofit/>
+          </a:bodyPr>
           <a:lstStyle>
-            <a:lvl1pPr algn="ctr">
-              <a:defRPr sz="6000"/>
+            <a:lvl1pPr algn="l">
+              <a:defRPr sz="6600"/>
             </a:lvl1pPr>
           </a:lstStyle>
           <a:p>
             <a:r>
-              <a:rPr lang="zh-CN" altLang="en-US" smtClean="0"/>
+              <a:rPr lang="zh-CN" altLang="en-US"/>
               <a:t>单击此处编辑母版标题样式</a:t>
             </a:r>
-            <a:endParaRPr lang="zh-CN" altLang="en-US"/>
-          </a:p>
-        </p:txBody>
-      </p:sp>
-      <p:sp>
-        <p:nvSpPr>
-          <p:cNvPr id="3" name="副标题 2"/>
+            <a:endParaRPr lang="en-US" dirty="0"/>
+          </a:p>
+        </p:txBody>
+      </p:sp>
+      <p:sp>
+        <p:nvSpPr>
+          <p:cNvPr id="3" name="Subtitle 2"/>
           <p:cNvSpPr>
             <a:spLocks noGrp="1"/>
           </p:cNvSpPr>
@@ -168,20 +173,26 @@
         </p:nvSpPr>
         <p:spPr>
           <a:xfrm>
-            <a:off x="1524000" y="3602038"/>
-            <a:ext cx="9144000" cy="1655762"/>
-          </a:xfrm>
-        </p:spPr>
-        <p:txBody>
-          <a:bodyPr/>
+            <a:off x="2417780" y="3531204"/>
+            <a:ext cx="8637072" cy="977621"/>
+          </a:xfrm>
+        </p:spPr>
+        <p:txBody>
+          <a:bodyPr tIns="91440" bIns="91440">
+            <a:normAutofit/>
+          </a:bodyPr>
           <a:lstStyle>
-            <a:lvl1pPr marL="0" indent="0" algn="ctr">
-              <a:buNone/>
-              <a:defRPr sz="2400"/>
+            <a:lvl1pPr marL="0" indent="0" algn="l">
+              <a:buNone/>
+              <a:defRPr sz="1800" b="0" cap="all" baseline="0">
+                <a:solidFill>
+                  <a:schemeClr val="tx1"/>
+                </a:solidFill>
+              </a:defRPr>
             </a:lvl1pPr>
             <a:lvl2pPr marL="457200" indent="0" algn="ctr">
               <a:buNone/>
-              <a:defRPr sz="2000"/>
+              <a:defRPr sz="1800"/>
             </a:lvl2pPr>
             <a:lvl3pPr marL="914400" indent="0" algn="ctr">
               <a:buNone/>
@@ -214,30 +225,31 @@
           </a:lstStyle>
           <a:p>
             <a:r>
+              <a:rPr lang="zh-CN" altLang="en-US"/>
+              <a:t>单击此处编辑母版副标题样式</a:t>
+            </a:r>
+            <a:endParaRPr lang="en-US" dirty="0"/>
+          </a:p>
+        </p:txBody>
+      </p:sp>
+      <p:sp>
+        <p:nvSpPr>
+          <p:cNvPr id="4" name="Date Placeholder 3"/>
+          <p:cNvSpPr>
+            <a:spLocks noGrp="1"/>
+          </p:cNvSpPr>
+          <p:nvPr>
+            <p:ph type="dt" sz="half" idx="10"/>
+          </p:nvPr>
+        </p:nvSpPr>
+        <p:spPr/>
+        <p:txBody>
+          <a:bodyPr/>
+          <a:lstStyle/>
+          <a:p>
+            <a:fld id="{5C9B0FD3-3389-4CA1-8F23-5BF916A8AF6E}" type="datetimeFigureOut">
               <a:rPr lang="zh-CN" altLang="en-US" smtClean="0"/>
-              <a:t>单击此处编辑母版副标题样式</a:t>
-            </a:r>
-            <a:endParaRPr lang="zh-CN" altLang="en-US"/>
-          </a:p>
-        </p:txBody>
-      </p:sp>
-      <p:sp>
-        <p:nvSpPr>
-          <p:cNvPr id="4" name="日期占位符 3"/>
-          <p:cNvSpPr>
-            <a:spLocks noGrp="1"/>
-          </p:cNvSpPr>
-          <p:nvPr>
-            <p:ph type="dt" sz="half" idx="10"/>
-          </p:nvPr>
-        </p:nvSpPr>
-        <p:spPr/>
-        <p:txBody>
-          <a:bodyPr/>
-          <a:lstStyle/>
-          <a:p>
-            <a:fld id="{D997B5FA-0921-464F-AAE1-844C04324D75}" type="datetimeFigureOut">
-              <a:rPr lang="zh-CN" altLang="en-US" smtClean="0"/>
+              <a:t>2024/12/23</a:t>
             </a:fld>
             <a:endParaRPr lang="zh-CN" altLang="en-US"/>
           </a:p>
@@ -245,7 +257,7 @@
       </p:sp>
       <p:sp>
         <p:nvSpPr>
-          <p:cNvPr id="5" name="页脚占位符 4"/>
+          <p:cNvPr id="5" name="Footer Placeholder 4"/>
           <p:cNvSpPr>
             <a:spLocks noGrp="1"/>
           </p:cNvSpPr>
@@ -253,7 +265,12 @@
             <p:ph type="ftr" sz="quarter" idx="11"/>
           </p:nvPr>
         </p:nvSpPr>
-        <p:spPr/>
+        <p:spPr>
+          <a:xfrm>
+            <a:off x="2416500" y="329307"/>
+            <a:ext cx="4973915" cy="309201"/>
+          </a:xfrm>
+        </p:spPr>
         <p:txBody>
           <a:bodyPr/>
           <a:lstStyle/>
@@ -264,7 +281,7 @@
       </p:sp>
       <p:sp>
         <p:nvSpPr>
-          <p:cNvPr id="6" name="灯片编号占位符 5"/>
+          <p:cNvPr id="6" name="Slide Number Placeholder 5"/>
           <p:cNvSpPr>
             <a:spLocks noGrp="1"/>
           </p:cNvSpPr>
@@ -272,19 +289,61 @@
             <p:ph type="sldNum" sz="quarter" idx="12"/>
           </p:nvPr>
         </p:nvSpPr>
-        <p:spPr/>
-        <p:txBody>
-          <a:bodyPr/>
-          <a:lstStyle/>
-          <a:p>
-            <a:fld id="{565CE74E-AB26-4998-AD42-012C4C1AD076}" type="slidenum">
+        <p:spPr>
+          <a:xfrm>
+            <a:off x="1437664" y="798973"/>
+            <a:ext cx="811019" cy="503578"/>
+          </a:xfrm>
+        </p:spPr>
+        <p:txBody>
+          <a:bodyPr/>
+          <a:lstStyle/>
+          <a:p>
+            <a:fld id="{FFDAE15B-D4B7-402B-A073-917161BA51E1}" type="slidenum">
               <a:rPr lang="zh-CN" altLang="en-US" smtClean="0"/>
+              <a:t>‹#›</a:t>
             </a:fld>
             <a:endParaRPr lang="zh-CN" altLang="en-US"/>
           </a:p>
         </p:txBody>
       </p:sp>
+      <p:cxnSp>
+        <p:nvCxnSpPr>
+          <p:cNvPr id="15" name="Straight Connector 14"/>
+          <p:cNvCxnSpPr/>
+          <p:nvPr/>
+        </p:nvCxnSpPr>
+        <p:spPr>
+          <a:xfrm>
+            <a:off x="2417780" y="3528542"/>
+            <a:ext cx="8637072" cy="0"/>
+          </a:xfrm>
+          <a:prstGeom prst="line">
+            <a:avLst/>
+          </a:prstGeom>
+          <a:ln w="31750"/>
+        </p:spPr>
+        <p:style>
+          <a:lnRef idx="3">
+            <a:schemeClr val="accent1"/>
+          </a:lnRef>
+          <a:fillRef idx="0">
+            <a:schemeClr val="accent1"/>
+          </a:fillRef>
+          <a:effectRef idx="2">
+            <a:schemeClr val="accent1"/>
+          </a:effectRef>
+          <a:fontRef idx="minor">
+            <a:schemeClr val="tx1"/>
+          </a:fontRef>
+        </p:style>
+      </p:cxnSp>
     </p:spTree>
+    <p:extLst>
+      <p:ext uri="{BB962C8B-B14F-4D97-AF65-F5344CB8AC3E}">
+        <p14:creationId xmlns:p14="http://schemas.microsoft.com/office/powerpoint/2010/main" val="2700752086"/>
+      </p:ext>
+    </p:extLst>
   </p:cSld>
   <p:clrMapOvr>
     <a:masterClrMapping/>
@@ -311,7 +370,7 @@
       </p:grpSpPr>
       <p:sp>
         <p:nvSpPr>
-          <p:cNvPr id="2" name="标题 1"/>
+          <p:cNvPr id="2" name="Title 1"/>
           <p:cNvSpPr>
             <a:spLocks noGrp="1"/>
           </p:cNvSpPr>
@@ -325,86 +384,83 @@
           <a:lstStyle/>
           <a:p>
             <a:r>
+              <a:rPr lang="zh-CN" altLang="en-US"/>
+              <a:t>单击此处编辑母版标题样式</a:t>
+            </a:r>
+            <a:endParaRPr lang="en-US" dirty="0"/>
+          </a:p>
+        </p:txBody>
+      </p:sp>
+      <p:sp>
+        <p:nvSpPr>
+          <p:cNvPr id="3" name="Vertical Text Placeholder 2"/>
+          <p:cNvSpPr>
+            <a:spLocks noGrp="1"/>
+          </p:cNvSpPr>
+          <p:nvPr>
+            <p:ph type="body" orient="vert" idx="1"/>
+          </p:nvPr>
+        </p:nvSpPr>
+        <p:spPr/>
+        <p:txBody>
+          <a:bodyPr vert="eaVert"/>
+          <a:lstStyle/>
+          <a:p>
+            <a:pPr lvl="0"/>
+            <a:r>
+              <a:rPr lang="zh-CN" altLang="en-US"/>
+              <a:t>单击此处编辑母版文本样式</a:t>
+            </a:r>
+          </a:p>
+          <a:p>
+            <a:pPr lvl="1"/>
+            <a:r>
+              <a:rPr lang="zh-CN" altLang="en-US"/>
+              <a:t>二级</a:t>
+            </a:r>
+          </a:p>
+          <a:p>
+            <a:pPr lvl="2"/>
+            <a:r>
+              <a:rPr lang="zh-CN" altLang="en-US"/>
+              <a:t>三级</a:t>
+            </a:r>
+          </a:p>
+          <a:p>
+            <a:pPr lvl="3"/>
+            <a:r>
+              <a:rPr lang="zh-CN" altLang="en-US"/>
+              <a:t>四级</a:t>
+            </a:r>
+          </a:p>
+          <a:p>
+            <a:pPr lvl="4"/>
+            <a:r>
+              <a:rPr lang="zh-CN" altLang="en-US"/>
+              <a:t>五级</a:t>
+            </a:r>
+            <a:endParaRPr lang="en-US" dirty="0"/>
+          </a:p>
+        </p:txBody>
+      </p:sp>
+      <p:sp>
+        <p:nvSpPr>
+          <p:cNvPr id="4" name="Date Placeholder 3"/>
+          <p:cNvSpPr>
+            <a:spLocks noGrp="1"/>
+          </p:cNvSpPr>
+          <p:nvPr>
+            <p:ph type="dt" sz="half" idx="10"/>
+          </p:nvPr>
+        </p:nvSpPr>
+        <p:spPr/>
+        <p:txBody>
+          <a:bodyPr/>
+          <a:lstStyle/>
+          <a:p>
+            <a:fld id="{5C9B0FD3-3389-4CA1-8F23-5BF916A8AF6E}" type="datetimeFigureOut">
               <a:rPr lang="zh-CN" altLang="en-US" smtClean="0"/>
-              <a:t>单击此处编辑母版标题样式</a:t>
-            </a:r>
-            <a:endParaRPr lang="zh-CN" altLang="en-US"/>
-          </a:p>
-        </p:txBody>
-      </p:sp>
-      <p:sp>
-        <p:nvSpPr>
-          <p:cNvPr id="3" name="竖排文字占位符 2"/>
-          <p:cNvSpPr>
-            <a:spLocks noGrp="1"/>
-          </p:cNvSpPr>
-          <p:nvPr>
-            <p:ph type="body" orient="vert" idx="1"/>
-          </p:nvPr>
-        </p:nvSpPr>
-        <p:spPr/>
-        <p:txBody>
-          <a:bodyPr vert="eaVert"/>
-          <a:lstStyle/>
-          <a:p>
-            <a:pPr lvl="0"/>
-            <a:r>
-              <a:rPr lang="zh-CN" altLang="en-US" smtClean="0"/>
-              <a:t>单击此处编辑母版文本样式</a:t>
-            </a:r>
-            <a:endParaRPr lang="zh-CN" altLang="en-US" smtClean="0"/>
-          </a:p>
-          <a:p>
-            <a:pPr lvl="1"/>
-            <a:r>
-              <a:rPr lang="zh-CN" altLang="en-US" smtClean="0"/>
-              <a:t>第二级</a:t>
-            </a:r>
-            <a:endParaRPr lang="zh-CN" altLang="en-US" smtClean="0"/>
-          </a:p>
-          <a:p>
-            <a:pPr lvl="2"/>
-            <a:r>
-              <a:rPr lang="zh-CN" altLang="en-US" smtClean="0"/>
-              <a:t>第三级</a:t>
-            </a:r>
-            <a:endParaRPr lang="zh-CN" altLang="en-US" smtClean="0"/>
-          </a:p>
-          <a:p>
-            <a:pPr lvl="3"/>
-            <a:r>
-              <a:rPr lang="zh-CN" altLang="en-US" smtClean="0"/>
-              <a:t>第四级</a:t>
-            </a:r>
-            <a:endParaRPr lang="zh-CN" altLang="en-US" smtClean="0"/>
-          </a:p>
-          <a:p>
-            <a:pPr lvl="4"/>
-            <a:r>
-              <a:rPr lang="zh-CN" altLang="en-US" smtClean="0"/>
-              <a:t>第五级</a:t>
-            </a:r>
-            <a:endParaRPr lang="zh-CN" altLang="en-US"/>
-          </a:p>
-        </p:txBody>
-      </p:sp>
-      <p:sp>
-        <p:nvSpPr>
-          <p:cNvPr id="4" name="日期占位符 3"/>
-          <p:cNvSpPr>
-            <a:spLocks noGrp="1"/>
-          </p:cNvSpPr>
-          <p:nvPr>
-            <p:ph type="dt" sz="half" idx="10"/>
-          </p:nvPr>
-        </p:nvSpPr>
-        <p:spPr/>
-        <p:txBody>
-          <a:bodyPr/>
-          <a:lstStyle/>
-          <a:p>
-            <a:fld id="{D997B5FA-0921-464F-AAE1-844C04324D75}" type="datetimeFigureOut">
-              <a:rPr lang="zh-CN" altLang="en-US" smtClean="0"/>
+              <a:t>2024/12/23</a:t>
             </a:fld>
             <a:endParaRPr lang="zh-CN" altLang="en-US"/>
           </a:p>
@@ -412,7 +468,7 @@
       </p:sp>
       <p:sp>
         <p:nvSpPr>
-          <p:cNvPr id="5" name="页脚占位符 4"/>
+          <p:cNvPr id="5" name="Footer Placeholder 4"/>
           <p:cNvSpPr>
             <a:spLocks noGrp="1"/>
           </p:cNvSpPr>
@@ -431,7 +487,7 @@
       </p:sp>
       <p:sp>
         <p:nvSpPr>
-          <p:cNvPr id="6" name="灯片编号占位符 5"/>
+          <p:cNvPr id="6" name="Slide Number Placeholder 5"/>
           <p:cNvSpPr>
             <a:spLocks noGrp="1"/>
           </p:cNvSpPr>
@@ -444,14 +500,51 @@
           <a:bodyPr/>
           <a:lstStyle/>
           <a:p>
-            <a:fld id="{565CE74E-AB26-4998-AD42-012C4C1AD076}" type="slidenum">
+            <a:fld id="{FFDAE15B-D4B7-402B-A073-917161BA51E1}" type="slidenum">
               <a:rPr lang="zh-CN" altLang="en-US" smtClean="0"/>
+              <a:t>‹#›</a:t>
             </a:fld>
             <a:endParaRPr lang="zh-CN" altLang="en-US"/>
           </a:p>
         </p:txBody>
       </p:sp>
+      <p:cxnSp>
+        <p:nvCxnSpPr>
+          <p:cNvPr id="26" name="Straight Connector 25"/>
+          <p:cNvCxnSpPr/>
+          <p:nvPr/>
+        </p:nvCxnSpPr>
+        <p:spPr>
+          <a:xfrm>
+            <a:off x="1453896" y="1847088"/>
+            <a:ext cx="9607522" cy="0"/>
+          </a:xfrm>
+          <a:prstGeom prst="line">
+            <a:avLst/>
+          </a:prstGeom>
+          <a:ln w="31750"/>
+        </p:spPr>
+        <p:style>
+          <a:lnRef idx="3">
+            <a:schemeClr val="accent1"/>
+          </a:lnRef>
+          <a:fillRef idx="0">
+            <a:schemeClr val="accent1"/>
+          </a:fillRef>
+          <a:effectRef idx="2">
+            <a:schemeClr val="accent1"/>
+          </a:effectRef>
+          <a:fontRef idx="minor">
+            <a:schemeClr val="tx1"/>
+          </a:fontRef>
+        </p:style>
+      </p:cxnSp>
     </p:spTree>
+    <p:extLst>
+      <p:ext uri="{BB962C8B-B14F-4D97-AF65-F5344CB8AC3E}">
+        <p14:creationId xmlns:p14="http://schemas.microsoft.com/office/powerpoint/2010/main" val="2889403490"/>
+      </p:ext>
+    </p:extLst>
   </p:cSld>
   <p:clrMapOvr>
     <a:masterClrMapping/>
@@ -461,7 +554,7 @@
 
 <file path=ppt/slideLayouts/slideLayout11.xml><?xml version="1.0" encoding="utf-8"?>
 <p:sldLayout xmlns:a="http://schemas.openxmlformats.org/drawingml/2006/main" xmlns:r="http://schemas.openxmlformats.org/officeDocument/2006/relationships" xmlns:p="http://schemas.openxmlformats.org/presentationml/2006/main" type="vertTitleAndTx" preserve="1">
-  <p:cSld name="垂直排列标题与&#10;文本">
+  <p:cSld name="竖排标题与文本">
     <p:spTree>
       <p:nvGrpSpPr>
         <p:cNvPr id="1" name=""/>
@@ -478,7 +571,7 @@
       </p:grpSpPr>
       <p:sp>
         <p:nvSpPr>
-          <p:cNvPr id="2" name="竖排标题 1"/>
+          <p:cNvPr id="2" name="Vertical Title 1"/>
           <p:cNvSpPr>
             <a:spLocks noGrp="1"/>
           </p:cNvSpPr>
@@ -488,100 +581,101 @@
         </p:nvSpPr>
         <p:spPr>
           <a:xfrm>
-            <a:off x="8724900" y="365125"/>
-            <a:ext cx="2628900" cy="5811838"/>
+            <a:off x="9439111" y="798973"/>
+            <a:ext cx="1615742" cy="4659889"/>
           </a:xfrm>
         </p:spPr>
         <p:txBody>
           <a:bodyPr vert="eaVert"/>
-          <a:lstStyle/>
-          <a:p>
-            <a:r>
+          <a:lstStyle>
+            <a:lvl1pPr algn="l">
+              <a:defRPr/>
+            </a:lvl1pPr>
+          </a:lstStyle>
+          <a:p>
+            <a:r>
+              <a:rPr lang="zh-CN" altLang="en-US"/>
+              <a:t>单击此处编辑母版标题样式</a:t>
+            </a:r>
+            <a:endParaRPr lang="en-US" dirty="0"/>
+          </a:p>
+        </p:txBody>
+      </p:sp>
+      <p:sp>
+        <p:nvSpPr>
+          <p:cNvPr id="3" name="Vertical Text Placeholder 2"/>
+          <p:cNvSpPr>
+            <a:spLocks noGrp="1"/>
+          </p:cNvSpPr>
+          <p:nvPr>
+            <p:ph type="body" orient="vert" idx="1"/>
+          </p:nvPr>
+        </p:nvSpPr>
+        <p:spPr>
+          <a:xfrm>
+            <a:off x="1444672" y="798973"/>
+            <a:ext cx="7828830" cy="4659889"/>
+          </a:xfrm>
+        </p:spPr>
+        <p:txBody>
+          <a:bodyPr vert="eaVert"/>
+          <a:lstStyle/>
+          <a:p>
+            <a:pPr lvl="0"/>
+            <a:r>
+              <a:rPr lang="zh-CN" altLang="en-US"/>
+              <a:t>单击此处编辑母版文本样式</a:t>
+            </a:r>
+          </a:p>
+          <a:p>
+            <a:pPr lvl="1"/>
+            <a:r>
+              <a:rPr lang="zh-CN" altLang="en-US"/>
+              <a:t>二级</a:t>
+            </a:r>
+          </a:p>
+          <a:p>
+            <a:pPr lvl="2"/>
+            <a:r>
+              <a:rPr lang="zh-CN" altLang="en-US"/>
+              <a:t>三级</a:t>
+            </a:r>
+          </a:p>
+          <a:p>
+            <a:pPr lvl="3"/>
+            <a:r>
+              <a:rPr lang="zh-CN" altLang="en-US"/>
+              <a:t>四级</a:t>
+            </a:r>
+          </a:p>
+          <a:p>
+            <a:pPr lvl="4"/>
+            <a:r>
+              <a:rPr lang="zh-CN" altLang="en-US"/>
+              <a:t>五级</a:t>
+            </a:r>
+            <a:endParaRPr lang="en-US" dirty="0"/>
+          </a:p>
+        </p:txBody>
+      </p:sp>
+      <p:sp>
+        <p:nvSpPr>
+          <p:cNvPr id="4" name="Date Placeholder 3"/>
+          <p:cNvSpPr>
+            <a:spLocks noGrp="1"/>
+          </p:cNvSpPr>
+          <p:nvPr>
+            <p:ph type="dt" sz="half" idx="10"/>
+          </p:nvPr>
+        </p:nvSpPr>
+        <p:spPr/>
+        <p:txBody>
+          <a:bodyPr/>
+          <a:lstStyle/>
+          <a:p>
+            <a:fld id="{5C9B0FD3-3389-4CA1-8F23-5BF916A8AF6E}" type="datetimeFigureOut">
               <a:rPr lang="zh-CN" altLang="en-US" smtClean="0"/>
-              <a:t>单击此处编辑母版标题样式</a:t>
-            </a:r>
-            <a:endParaRPr lang="zh-CN" altLang="en-US"/>
-          </a:p>
-        </p:txBody>
-      </p:sp>
-      <p:sp>
-        <p:nvSpPr>
-          <p:cNvPr id="3" name="竖排文字占位符 2"/>
-          <p:cNvSpPr>
-            <a:spLocks noGrp="1"/>
-          </p:cNvSpPr>
-          <p:nvPr>
-            <p:ph type="body" orient="vert" idx="1"/>
-          </p:nvPr>
-        </p:nvSpPr>
-        <p:spPr>
-          <a:xfrm>
-            <a:off x="838200" y="365125"/>
-            <a:ext cx="7734300" cy="5811838"/>
-          </a:xfrm>
-        </p:spPr>
-        <p:txBody>
-          <a:bodyPr vert="eaVert"/>
-          <a:lstStyle/>
-          <a:p>
-            <a:pPr lvl="0"/>
-            <a:r>
-              <a:rPr lang="zh-CN" altLang="en-US" smtClean="0"/>
-              <a:t>单击此处编辑母版文本样式</a:t>
-            </a:r>
-            <a:endParaRPr lang="zh-CN" altLang="en-US" smtClean="0"/>
-          </a:p>
-          <a:p>
-            <a:pPr lvl="1"/>
-            <a:r>
-              <a:rPr lang="zh-CN" altLang="en-US" smtClean="0"/>
-              <a:t>第二级</a:t>
-            </a:r>
-            <a:endParaRPr lang="zh-CN" altLang="en-US" smtClean="0"/>
-          </a:p>
-          <a:p>
-            <a:pPr lvl="2"/>
-            <a:r>
-              <a:rPr lang="zh-CN" altLang="en-US" smtClean="0"/>
-              <a:t>第三级</a:t>
-            </a:r>
-            <a:endParaRPr lang="zh-CN" altLang="en-US" smtClean="0"/>
-          </a:p>
-          <a:p>
-            <a:pPr lvl="3"/>
-            <a:r>
-              <a:rPr lang="zh-CN" altLang="en-US" smtClean="0"/>
-              <a:t>第四级</a:t>
-            </a:r>
-            <a:endParaRPr lang="zh-CN" altLang="en-US" smtClean="0"/>
-          </a:p>
-          <a:p>
-            <a:pPr lvl="4"/>
-            <a:r>
-              <a:rPr lang="zh-CN" altLang="en-US" smtClean="0"/>
-              <a:t>第五级</a:t>
-            </a:r>
-            <a:endParaRPr lang="zh-CN" altLang="en-US"/>
-          </a:p>
-        </p:txBody>
-      </p:sp>
-      <p:sp>
-        <p:nvSpPr>
-          <p:cNvPr id="4" name="日期占位符 3"/>
-          <p:cNvSpPr>
-            <a:spLocks noGrp="1"/>
-          </p:cNvSpPr>
-          <p:nvPr>
-            <p:ph type="dt" sz="half" idx="10"/>
-          </p:nvPr>
-        </p:nvSpPr>
-        <p:spPr/>
-        <p:txBody>
-          <a:bodyPr/>
-          <a:lstStyle/>
-          <a:p>
-            <a:fld id="{D997B5FA-0921-464F-AAE1-844C04324D75}" type="datetimeFigureOut">
-              <a:rPr lang="zh-CN" altLang="en-US" smtClean="0"/>
+              <a:t>2024/12/23</a:t>
             </a:fld>
             <a:endParaRPr lang="zh-CN" altLang="en-US"/>
           </a:p>
@@ -589,7 +683,7 @@
       </p:sp>
       <p:sp>
         <p:nvSpPr>
-          <p:cNvPr id="5" name="页脚占位符 4"/>
+          <p:cNvPr id="5" name="Footer Placeholder 4"/>
           <p:cNvSpPr>
             <a:spLocks noGrp="1"/>
           </p:cNvSpPr>
@@ -608,7 +702,7 @@
       </p:sp>
       <p:sp>
         <p:nvSpPr>
-          <p:cNvPr id="6" name="灯片编号占位符 5"/>
+          <p:cNvPr id="6" name="Slide Number Placeholder 5"/>
           <p:cNvSpPr>
             <a:spLocks noGrp="1"/>
           </p:cNvSpPr>
@@ -621,14 +715,51 @@
           <a:bodyPr/>
           <a:lstStyle/>
           <a:p>
-            <a:fld id="{565CE74E-AB26-4998-AD42-012C4C1AD076}" type="slidenum">
+            <a:fld id="{FFDAE15B-D4B7-402B-A073-917161BA51E1}" type="slidenum">
               <a:rPr lang="zh-CN" altLang="en-US" smtClean="0"/>
+              <a:t>‹#›</a:t>
             </a:fld>
             <a:endParaRPr lang="zh-CN" altLang="en-US"/>
           </a:p>
         </p:txBody>
       </p:sp>
+      <p:cxnSp>
+        <p:nvCxnSpPr>
+          <p:cNvPr id="15" name="Straight Connector 14"/>
+          <p:cNvCxnSpPr/>
+          <p:nvPr/>
+        </p:nvCxnSpPr>
+        <p:spPr>
+          <a:xfrm>
+            <a:off x="9439111" y="798973"/>
+            <a:ext cx="0" cy="4659889"/>
+          </a:xfrm>
+          <a:prstGeom prst="line">
+            <a:avLst/>
+          </a:prstGeom>
+          <a:ln w="31750"/>
+        </p:spPr>
+        <p:style>
+          <a:lnRef idx="3">
+            <a:schemeClr val="accent1"/>
+          </a:lnRef>
+          <a:fillRef idx="0">
+            <a:schemeClr val="accent1"/>
+          </a:fillRef>
+          <a:effectRef idx="2">
+            <a:schemeClr val="accent1"/>
+          </a:effectRef>
+          <a:fontRef idx="minor">
+            <a:schemeClr val="tx1"/>
+          </a:fontRef>
+        </p:style>
+      </p:cxnSp>
     </p:spTree>
+    <p:extLst>
+      <p:ext uri="{BB962C8B-B14F-4D97-AF65-F5344CB8AC3E}">
+        <p14:creationId xmlns:p14="http://schemas.microsoft.com/office/powerpoint/2010/main" val="3998010603"/>
+      </p:ext>
+    </p:extLst>
   </p:cSld>
   <p:clrMapOvr>
     <a:masterClrMapping/>
@@ -655,7 +786,7 @@
       </p:grpSpPr>
       <p:sp>
         <p:nvSpPr>
-          <p:cNvPr id="2" name="标题 1"/>
+          <p:cNvPr id="2" name="Title 1"/>
           <p:cNvSpPr>
             <a:spLocks noGrp="1"/>
           </p:cNvSpPr>
@@ -669,86 +800,83 @@
           <a:lstStyle/>
           <a:p>
             <a:r>
+              <a:rPr lang="zh-CN" altLang="en-US"/>
+              <a:t>单击此处编辑母版标题样式</a:t>
+            </a:r>
+            <a:endParaRPr lang="en-US" dirty="0"/>
+          </a:p>
+        </p:txBody>
+      </p:sp>
+      <p:sp>
+        <p:nvSpPr>
+          <p:cNvPr id="3" name="Content Placeholder 2"/>
+          <p:cNvSpPr>
+            <a:spLocks noGrp="1"/>
+          </p:cNvSpPr>
+          <p:nvPr>
+            <p:ph idx="1"/>
+          </p:nvPr>
+        </p:nvSpPr>
+        <p:spPr/>
+        <p:txBody>
+          <a:bodyPr anchor="t"/>
+          <a:lstStyle/>
+          <a:p>
+            <a:pPr lvl="0"/>
+            <a:r>
+              <a:rPr lang="zh-CN" altLang="en-US"/>
+              <a:t>单击此处编辑母版文本样式</a:t>
+            </a:r>
+          </a:p>
+          <a:p>
+            <a:pPr lvl="1"/>
+            <a:r>
+              <a:rPr lang="zh-CN" altLang="en-US"/>
+              <a:t>二级</a:t>
+            </a:r>
+          </a:p>
+          <a:p>
+            <a:pPr lvl="2"/>
+            <a:r>
+              <a:rPr lang="zh-CN" altLang="en-US"/>
+              <a:t>三级</a:t>
+            </a:r>
+          </a:p>
+          <a:p>
+            <a:pPr lvl="3"/>
+            <a:r>
+              <a:rPr lang="zh-CN" altLang="en-US"/>
+              <a:t>四级</a:t>
+            </a:r>
+          </a:p>
+          <a:p>
+            <a:pPr lvl="4"/>
+            <a:r>
+              <a:rPr lang="zh-CN" altLang="en-US"/>
+              <a:t>五级</a:t>
+            </a:r>
+            <a:endParaRPr lang="en-US" dirty="0"/>
+          </a:p>
+        </p:txBody>
+      </p:sp>
+      <p:sp>
+        <p:nvSpPr>
+          <p:cNvPr id="4" name="Date Placeholder 3"/>
+          <p:cNvSpPr>
+            <a:spLocks noGrp="1"/>
+          </p:cNvSpPr>
+          <p:nvPr>
+            <p:ph type="dt" sz="half" idx="10"/>
+          </p:nvPr>
+        </p:nvSpPr>
+        <p:spPr/>
+        <p:txBody>
+          <a:bodyPr/>
+          <a:lstStyle/>
+          <a:p>
+            <a:fld id="{5C9B0FD3-3389-4CA1-8F23-5BF916A8AF6E}" type="datetimeFigureOut">
               <a:rPr lang="zh-CN" altLang="en-US" smtClean="0"/>
-              <a:t>单击此处编辑母版标题样式</a:t>
-            </a:r>
-            <a:endParaRPr lang="zh-CN" altLang="en-US"/>
-          </a:p>
-        </p:txBody>
-      </p:sp>
-      <p:sp>
-        <p:nvSpPr>
-          <p:cNvPr id="3" name="内容占位符 2"/>
-          <p:cNvSpPr>
-            <a:spLocks noGrp="1"/>
-          </p:cNvSpPr>
-          <p:nvPr>
-            <p:ph idx="1"/>
-          </p:nvPr>
-        </p:nvSpPr>
-        <p:spPr/>
-        <p:txBody>
-          <a:bodyPr/>
-          <a:lstStyle/>
-          <a:p>
-            <a:pPr lvl="0"/>
-            <a:r>
-              <a:rPr lang="zh-CN" altLang="en-US" smtClean="0"/>
-              <a:t>单击此处编辑母版文本样式</a:t>
-            </a:r>
-            <a:endParaRPr lang="zh-CN" altLang="en-US" smtClean="0"/>
-          </a:p>
-          <a:p>
-            <a:pPr lvl="1"/>
-            <a:r>
-              <a:rPr lang="zh-CN" altLang="en-US" smtClean="0"/>
-              <a:t>第二级</a:t>
-            </a:r>
-            <a:endParaRPr lang="zh-CN" altLang="en-US" smtClean="0"/>
-          </a:p>
-          <a:p>
-            <a:pPr lvl="2"/>
-            <a:r>
-              <a:rPr lang="zh-CN" altLang="en-US" smtClean="0"/>
-              <a:t>第三级</a:t>
-            </a:r>
-            <a:endParaRPr lang="zh-CN" altLang="en-US" smtClean="0"/>
-          </a:p>
-          <a:p>
-            <a:pPr lvl="3"/>
-            <a:r>
-              <a:rPr lang="zh-CN" altLang="en-US" smtClean="0"/>
-              <a:t>第四级</a:t>
-            </a:r>
-            <a:endParaRPr lang="zh-CN" altLang="en-US" smtClean="0"/>
-          </a:p>
-          <a:p>
-            <a:pPr lvl="4"/>
-            <a:r>
-              <a:rPr lang="zh-CN" altLang="en-US" smtClean="0"/>
-              <a:t>第五级</a:t>
-            </a:r>
-            <a:endParaRPr lang="zh-CN" altLang="en-US"/>
-          </a:p>
-        </p:txBody>
-      </p:sp>
-      <p:sp>
-        <p:nvSpPr>
-          <p:cNvPr id="4" name="日期占位符 3"/>
-          <p:cNvSpPr>
-            <a:spLocks noGrp="1"/>
-          </p:cNvSpPr>
-          <p:nvPr>
-            <p:ph type="dt" sz="half" idx="10"/>
-          </p:nvPr>
-        </p:nvSpPr>
-        <p:spPr/>
-        <p:txBody>
-          <a:bodyPr/>
-          <a:lstStyle/>
-          <a:p>
-            <a:fld id="{D997B5FA-0921-464F-AAE1-844C04324D75}" type="datetimeFigureOut">
-              <a:rPr lang="zh-CN" altLang="en-US" smtClean="0"/>
+              <a:t>2024/12/23</a:t>
             </a:fld>
             <a:endParaRPr lang="zh-CN" altLang="en-US"/>
           </a:p>
@@ -756,7 +884,7 @@
       </p:sp>
       <p:sp>
         <p:nvSpPr>
-          <p:cNvPr id="5" name="页脚占位符 4"/>
+          <p:cNvPr id="5" name="Footer Placeholder 4"/>
           <p:cNvSpPr>
             <a:spLocks noGrp="1"/>
           </p:cNvSpPr>
@@ -775,7 +903,7 @@
       </p:sp>
       <p:sp>
         <p:nvSpPr>
-          <p:cNvPr id="6" name="灯片编号占位符 5"/>
+          <p:cNvPr id="6" name="Slide Number Placeholder 5"/>
           <p:cNvSpPr>
             <a:spLocks noGrp="1"/>
           </p:cNvSpPr>
@@ -788,14 +916,51 @@
           <a:bodyPr/>
           <a:lstStyle/>
           <a:p>
-            <a:fld id="{565CE74E-AB26-4998-AD42-012C4C1AD076}" type="slidenum">
+            <a:fld id="{FFDAE15B-D4B7-402B-A073-917161BA51E1}" type="slidenum">
               <a:rPr lang="zh-CN" altLang="en-US" smtClean="0"/>
+              <a:t>‹#›</a:t>
             </a:fld>
             <a:endParaRPr lang="zh-CN" altLang="en-US"/>
           </a:p>
         </p:txBody>
       </p:sp>
+      <p:cxnSp>
+        <p:nvCxnSpPr>
+          <p:cNvPr id="33" name="Straight Connector 32"/>
+          <p:cNvCxnSpPr/>
+          <p:nvPr/>
+        </p:nvCxnSpPr>
+        <p:spPr>
+          <a:xfrm>
+            <a:off x="1453896" y="1847088"/>
+            <a:ext cx="9607522" cy="0"/>
+          </a:xfrm>
+          <a:prstGeom prst="line">
+            <a:avLst/>
+          </a:prstGeom>
+          <a:ln w="31750"/>
+        </p:spPr>
+        <p:style>
+          <a:lnRef idx="3">
+            <a:schemeClr val="accent1"/>
+          </a:lnRef>
+          <a:fillRef idx="0">
+            <a:schemeClr val="accent1"/>
+          </a:fillRef>
+          <a:effectRef idx="2">
+            <a:schemeClr val="accent1"/>
+          </a:effectRef>
+          <a:fontRef idx="minor">
+            <a:schemeClr val="tx1"/>
+          </a:fontRef>
+        </p:style>
+      </p:cxnSp>
     </p:spTree>
+    <p:extLst>
+      <p:ext uri="{BB962C8B-B14F-4D97-AF65-F5344CB8AC3E}">
+        <p14:creationId xmlns:p14="http://schemas.microsoft.com/office/powerpoint/2010/main" val="133166008"/>
+      </p:ext>
+    </p:extLst>
   </p:cSld>
   <p:clrMapOvr>
     <a:masterClrMapping/>
@@ -822,7 +987,7 @@
       </p:grpSpPr>
       <p:sp>
         <p:nvSpPr>
-          <p:cNvPr id="2" name="标题 1"/>
+          <p:cNvPr id="2" name="Title 1"/>
           <p:cNvSpPr>
             <a:spLocks noGrp="1"/>
           </p:cNvSpPr>
@@ -832,29 +997,31 @@
         </p:nvSpPr>
         <p:spPr>
           <a:xfrm>
-            <a:off x="831850" y="1709738"/>
-            <a:ext cx="10515600" cy="2852737"/>
-          </a:xfrm>
-        </p:spPr>
-        <p:txBody>
-          <a:bodyPr anchor="b"/>
+            <a:off x="1454239" y="1756130"/>
+            <a:ext cx="8643154" cy="1887950"/>
+          </a:xfrm>
+        </p:spPr>
+        <p:txBody>
+          <a:bodyPr anchor="b">
+            <a:normAutofit/>
+          </a:bodyPr>
           <a:lstStyle>
-            <a:lvl1pPr>
-              <a:defRPr sz="6000"/>
+            <a:lvl1pPr algn="l">
+              <a:defRPr sz="3600"/>
             </a:lvl1pPr>
           </a:lstStyle>
           <a:p>
             <a:r>
-              <a:rPr lang="zh-CN" altLang="en-US" smtClean="0"/>
+              <a:rPr lang="zh-CN" altLang="en-US"/>
               <a:t>单击此处编辑母版标题样式</a:t>
             </a:r>
-            <a:endParaRPr lang="zh-CN" altLang="en-US"/>
-          </a:p>
-        </p:txBody>
-      </p:sp>
-      <p:sp>
-        <p:nvSpPr>
-          <p:cNvPr id="3" name="文本占位符 2"/>
+            <a:endParaRPr lang="en-US" dirty="0"/>
+          </a:p>
+        </p:txBody>
+      </p:sp>
+      <p:sp>
+        <p:nvSpPr>
+          <p:cNvPr id="3" name="Text Placeholder 2"/>
           <p:cNvSpPr>
             <a:spLocks noGrp="1"/>
           </p:cNvSpPr>
@@ -864,26 +1031,26 @@
         </p:nvSpPr>
         <p:spPr>
           <a:xfrm>
-            <a:off x="831850" y="4589463"/>
-            <a:ext cx="10515600" cy="1500187"/>
-          </a:xfrm>
-        </p:spPr>
-        <p:txBody>
-          <a:bodyPr/>
+            <a:off x="1454239" y="3806195"/>
+            <a:ext cx="8630446" cy="1012929"/>
+          </a:xfrm>
+        </p:spPr>
+        <p:txBody>
+          <a:bodyPr tIns="91440">
+            <a:normAutofit/>
+          </a:bodyPr>
           <a:lstStyle>
-            <a:lvl1pPr marL="0" indent="0">
-              <a:buNone/>
-              <a:defRPr sz="2400">
+            <a:lvl1pPr marL="0" indent="0" algn="l">
+              <a:buNone/>
+              <a:defRPr sz="1800">
                 <a:solidFill>
-                  <a:schemeClr val="tx1">
-                    <a:tint val="75000"/>
-                  </a:schemeClr>
+                  <a:schemeClr val="tx1"/>
                 </a:solidFill>
               </a:defRPr>
             </a:lvl1pPr>
             <a:lvl2pPr marL="457200" indent="0">
               <a:buNone/>
-              <a:defRPr sz="2000">
+              <a:defRPr sz="1800">
                 <a:solidFill>
                   <a:schemeClr val="tx1">
                     <a:tint val="75000"/>
@@ -965,30 +1132,30 @@
           <a:p>
             <a:pPr lvl="0"/>
             <a:r>
+              <a:rPr lang="zh-CN" altLang="en-US"/>
+              <a:t>单击此处编辑母版文本样式</a:t>
+            </a:r>
+          </a:p>
+        </p:txBody>
+      </p:sp>
+      <p:sp>
+        <p:nvSpPr>
+          <p:cNvPr id="4" name="Date Placeholder 3"/>
+          <p:cNvSpPr>
+            <a:spLocks noGrp="1"/>
+          </p:cNvSpPr>
+          <p:nvPr>
+            <p:ph type="dt" sz="half" idx="10"/>
+          </p:nvPr>
+        </p:nvSpPr>
+        <p:spPr/>
+        <p:txBody>
+          <a:bodyPr/>
+          <a:lstStyle/>
+          <a:p>
+            <a:fld id="{5C9B0FD3-3389-4CA1-8F23-5BF916A8AF6E}" type="datetimeFigureOut">
               <a:rPr lang="zh-CN" altLang="en-US" smtClean="0"/>
-              <a:t>单击此处编辑母版文本样式</a:t>
-            </a:r>
-            <a:endParaRPr lang="zh-CN" altLang="en-US" smtClean="0"/>
-          </a:p>
-        </p:txBody>
-      </p:sp>
-      <p:sp>
-        <p:nvSpPr>
-          <p:cNvPr id="4" name="日期占位符 3"/>
-          <p:cNvSpPr>
-            <a:spLocks noGrp="1"/>
-          </p:cNvSpPr>
-          <p:nvPr>
-            <p:ph type="dt" sz="half" idx="10"/>
-          </p:nvPr>
-        </p:nvSpPr>
-        <p:spPr/>
-        <p:txBody>
-          <a:bodyPr/>
-          <a:lstStyle/>
-          <a:p>
-            <a:fld id="{D997B5FA-0921-464F-AAE1-844C04324D75}" type="datetimeFigureOut">
-              <a:rPr lang="zh-CN" altLang="en-US" smtClean="0"/>
+              <a:t>2024/12/23</a:t>
             </a:fld>
             <a:endParaRPr lang="zh-CN" altLang="en-US"/>
           </a:p>
@@ -996,7 +1163,7 @@
       </p:sp>
       <p:sp>
         <p:nvSpPr>
-          <p:cNvPr id="5" name="页脚占位符 4"/>
+          <p:cNvPr id="5" name="Footer Placeholder 4"/>
           <p:cNvSpPr>
             <a:spLocks noGrp="1"/>
           </p:cNvSpPr>
@@ -1015,7 +1182,7 @@
       </p:sp>
       <p:sp>
         <p:nvSpPr>
-          <p:cNvPr id="6" name="灯片编号占位符 5"/>
+          <p:cNvPr id="6" name="Slide Number Placeholder 5"/>
           <p:cNvSpPr>
             <a:spLocks noGrp="1"/>
           </p:cNvSpPr>
@@ -1028,14 +1195,51 @@
           <a:bodyPr/>
           <a:lstStyle/>
           <a:p>
-            <a:fld id="{565CE74E-AB26-4998-AD42-012C4C1AD076}" type="slidenum">
+            <a:fld id="{FFDAE15B-D4B7-402B-A073-917161BA51E1}" type="slidenum">
               <a:rPr lang="zh-CN" altLang="en-US" smtClean="0"/>
+              <a:t>‹#›</a:t>
             </a:fld>
             <a:endParaRPr lang="zh-CN" altLang="en-US"/>
           </a:p>
         </p:txBody>
       </p:sp>
+      <p:cxnSp>
+        <p:nvCxnSpPr>
+          <p:cNvPr id="15" name="Straight Connector 14"/>
+          <p:cNvCxnSpPr/>
+          <p:nvPr/>
+        </p:nvCxnSpPr>
+        <p:spPr>
+          <a:xfrm>
+            <a:off x="1454239" y="3804985"/>
+            <a:ext cx="8630446" cy="0"/>
+          </a:xfrm>
+          <a:prstGeom prst="line">
+            <a:avLst/>
+          </a:prstGeom>
+          <a:ln w="31750"/>
+        </p:spPr>
+        <p:style>
+          <a:lnRef idx="3">
+            <a:schemeClr val="accent1"/>
+          </a:lnRef>
+          <a:fillRef idx="0">
+            <a:schemeClr val="accent1"/>
+          </a:fillRef>
+          <a:effectRef idx="2">
+            <a:schemeClr val="accent1"/>
+          </a:effectRef>
+          <a:fontRef idx="minor">
+            <a:schemeClr val="tx1"/>
+          </a:fontRef>
+        </p:style>
+      </p:cxnSp>
     </p:spTree>
+    <p:extLst>
+      <p:ext uri="{BB962C8B-B14F-4D97-AF65-F5344CB8AC3E}">
+        <p14:creationId xmlns:p14="http://schemas.microsoft.com/office/powerpoint/2010/main" val="2600060844"/>
+      </p:ext>
+    </p:extLst>
   </p:cSld>
   <p:clrMapOvr>
     <a:masterClrMapping/>
@@ -1062,7 +1266,7 @@
       </p:grpSpPr>
       <p:sp>
         <p:nvSpPr>
-          <p:cNvPr id="2" name="标题 1"/>
+          <p:cNvPr id="2" name="Title 1"/>
           <p:cNvSpPr>
             <a:spLocks noGrp="1"/>
           </p:cNvSpPr>
@@ -1070,158 +1274,156 @@
             <p:ph type="title"/>
           </p:nvPr>
         </p:nvSpPr>
+        <p:spPr>
+          <a:xfrm>
+            <a:off x="1449217" y="804889"/>
+            <a:ext cx="9605635" cy="1059305"/>
+          </a:xfrm>
+        </p:spPr>
+        <p:txBody>
+          <a:bodyPr/>
+          <a:lstStyle/>
+          <a:p>
+            <a:r>
+              <a:rPr lang="zh-CN" altLang="en-US"/>
+              <a:t>单击此处编辑母版标题样式</a:t>
+            </a:r>
+            <a:endParaRPr lang="en-US" dirty="0"/>
+          </a:p>
+        </p:txBody>
+      </p:sp>
+      <p:sp>
+        <p:nvSpPr>
+          <p:cNvPr id="3" name="Content Placeholder 2"/>
+          <p:cNvSpPr>
+            <a:spLocks noGrp="1"/>
+          </p:cNvSpPr>
+          <p:nvPr>
+            <p:ph sz="half" idx="1"/>
+          </p:nvPr>
+        </p:nvSpPr>
+        <p:spPr>
+          <a:xfrm>
+            <a:off x="1447331" y="2010878"/>
+            <a:ext cx="4645152" cy="3448595"/>
+          </a:xfrm>
+        </p:spPr>
+        <p:txBody>
+          <a:bodyPr/>
+          <a:lstStyle/>
+          <a:p>
+            <a:pPr lvl="0"/>
+            <a:r>
+              <a:rPr lang="zh-CN" altLang="en-US"/>
+              <a:t>单击此处编辑母版文本样式</a:t>
+            </a:r>
+          </a:p>
+          <a:p>
+            <a:pPr lvl="1"/>
+            <a:r>
+              <a:rPr lang="zh-CN" altLang="en-US"/>
+              <a:t>二级</a:t>
+            </a:r>
+          </a:p>
+          <a:p>
+            <a:pPr lvl="2"/>
+            <a:r>
+              <a:rPr lang="zh-CN" altLang="en-US"/>
+              <a:t>三级</a:t>
+            </a:r>
+          </a:p>
+          <a:p>
+            <a:pPr lvl="3"/>
+            <a:r>
+              <a:rPr lang="zh-CN" altLang="en-US"/>
+              <a:t>四级</a:t>
+            </a:r>
+          </a:p>
+          <a:p>
+            <a:pPr lvl="4"/>
+            <a:r>
+              <a:rPr lang="zh-CN" altLang="en-US"/>
+              <a:t>五级</a:t>
+            </a:r>
+            <a:endParaRPr lang="en-US" dirty="0"/>
+          </a:p>
+        </p:txBody>
+      </p:sp>
+      <p:sp>
+        <p:nvSpPr>
+          <p:cNvPr id="4" name="Content Placeholder 3"/>
+          <p:cNvSpPr>
+            <a:spLocks noGrp="1"/>
+          </p:cNvSpPr>
+          <p:nvPr>
+            <p:ph sz="half" idx="2"/>
+          </p:nvPr>
+        </p:nvSpPr>
+        <p:spPr>
+          <a:xfrm>
+            <a:off x="6413771" y="2017343"/>
+            <a:ext cx="4645152" cy="3441520"/>
+          </a:xfrm>
+        </p:spPr>
+        <p:txBody>
+          <a:bodyPr/>
+          <a:lstStyle/>
+          <a:p>
+            <a:pPr lvl="0"/>
+            <a:r>
+              <a:rPr lang="zh-CN" altLang="en-US"/>
+              <a:t>单击此处编辑母版文本样式</a:t>
+            </a:r>
+          </a:p>
+          <a:p>
+            <a:pPr lvl="1"/>
+            <a:r>
+              <a:rPr lang="zh-CN" altLang="en-US"/>
+              <a:t>二级</a:t>
+            </a:r>
+          </a:p>
+          <a:p>
+            <a:pPr lvl="2"/>
+            <a:r>
+              <a:rPr lang="zh-CN" altLang="en-US"/>
+              <a:t>三级</a:t>
+            </a:r>
+          </a:p>
+          <a:p>
+            <a:pPr lvl="3"/>
+            <a:r>
+              <a:rPr lang="zh-CN" altLang="en-US"/>
+              <a:t>四级</a:t>
+            </a:r>
+          </a:p>
+          <a:p>
+            <a:pPr lvl="4"/>
+            <a:r>
+              <a:rPr lang="zh-CN" altLang="en-US"/>
+              <a:t>五级</a:t>
+            </a:r>
+            <a:endParaRPr lang="en-US" dirty="0"/>
+          </a:p>
+        </p:txBody>
+      </p:sp>
+      <p:sp>
+        <p:nvSpPr>
+          <p:cNvPr id="5" name="Date Placeholder 4"/>
+          <p:cNvSpPr>
+            <a:spLocks noGrp="1"/>
+          </p:cNvSpPr>
+          <p:nvPr>
+            <p:ph type="dt" sz="half" idx="10"/>
+          </p:nvPr>
+        </p:nvSpPr>
         <p:spPr/>
         <p:txBody>
           <a:bodyPr/>
           <a:lstStyle/>
           <a:p>
-            <a:r>
+            <a:fld id="{5C9B0FD3-3389-4CA1-8F23-5BF916A8AF6E}" type="datetimeFigureOut">
               <a:rPr lang="zh-CN" altLang="en-US" smtClean="0"/>
-              <a:t>单击此处编辑母版标题样式</a:t>
-            </a:r>
-            <a:endParaRPr lang="zh-CN" altLang="en-US"/>
-          </a:p>
-        </p:txBody>
-      </p:sp>
-      <p:sp>
-        <p:nvSpPr>
-          <p:cNvPr id="3" name="内容占位符 2"/>
-          <p:cNvSpPr>
-            <a:spLocks noGrp="1"/>
-          </p:cNvSpPr>
-          <p:nvPr>
-            <p:ph sz="half" idx="1"/>
-          </p:nvPr>
-        </p:nvSpPr>
-        <p:spPr>
-          <a:xfrm>
-            <a:off x="838200" y="1825625"/>
-            <a:ext cx="5181600" cy="4351338"/>
-          </a:xfrm>
-        </p:spPr>
-        <p:txBody>
-          <a:bodyPr/>
-          <a:lstStyle/>
-          <a:p>
-            <a:pPr lvl="0"/>
-            <a:r>
-              <a:rPr lang="zh-CN" altLang="en-US" smtClean="0"/>
-              <a:t>单击此处编辑母版文本样式</a:t>
-            </a:r>
-            <a:endParaRPr lang="zh-CN" altLang="en-US" smtClean="0"/>
-          </a:p>
-          <a:p>
-            <a:pPr lvl="1"/>
-            <a:r>
-              <a:rPr lang="zh-CN" altLang="en-US" smtClean="0"/>
-              <a:t>第二级</a:t>
-            </a:r>
-            <a:endParaRPr lang="zh-CN" altLang="en-US" smtClean="0"/>
-          </a:p>
-          <a:p>
-            <a:pPr lvl="2"/>
-            <a:r>
-              <a:rPr lang="zh-CN" altLang="en-US" smtClean="0"/>
-              <a:t>第三级</a:t>
-            </a:r>
-            <a:endParaRPr lang="zh-CN" altLang="en-US" smtClean="0"/>
-          </a:p>
-          <a:p>
-            <a:pPr lvl="3"/>
-            <a:r>
-              <a:rPr lang="zh-CN" altLang="en-US" smtClean="0"/>
-              <a:t>第四级</a:t>
-            </a:r>
-            <a:endParaRPr lang="zh-CN" altLang="en-US" smtClean="0"/>
-          </a:p>
-          <a:p>
-            <a:pPr lvl="4"/>
-            <a:r>
-              <a:rPr lang="zh-CN" altLang="en-US" smtClean="0"/>
-              <a:t>第五级</a:t>
-            </a:r>
-            <a:endParaRPr lang="zh-CN" altLang="en-US"/>
-          </a:p>
-        </p:txBody>
-      </p:sp>
-      <p:sp>
-        <p:nvSpPr>
-          <p:cNvPr id="4" name="内容占位符 3"/>
-          <p:cNvSpPr>
-            <a:spLocks noGrp="1"/>
-          </p:cNvSpPr>
-          <p:nvPr>
-            <p:ph sz="half" idx="2"/>
-          </p:nvPr>
-        </p:nvSpPr>
-        <p:spPr>
-          <a:xfrm>
-            <a:off x="6172200" y="1825625"/>
-            <a:ext cx="5181600" cy="4351338"/>
-          </a:xfrm>
-        </p:spPr>
-        <p:txBody>
-          <a:bodyPr/>
-          <a:lstStyle/>
-          <a:p>
-            <a:pPr lvl="0"/>
-            <a:r>
-              <a:rPr lang="zh-CN" altLang="en-US" smtClean="0"/>
-              <a:t>单击此处编辑母版文本样式</a:t>
-            </a:r>
-            <a:endParaRPr lang="zh-CN" altLang="en-US" smtClean="0"/>
-          </a:p>
-          <a:p>
-            <a:pPr lvl="1"/>
-            <a:r>
-              <a:rPr lang="zh-CN" altLang="en-US" smtClean="0"/>
-              <a:t>第二级</a:t>
-            </a:r>
-            <a:endParaRPr lang="zh-CN" altLang="en-US" smtClean="0"/>
-          </a:p>
-          <a:p>
-            <a:pPr lvl="2"/>
-            <a:r>
-              <a:rPr lang="zh-CN" altLang="en-US" smtClean="0"/>
-              <a:t>第三级</a:t>
-            </a:r>
-            <a:endParaRPr lang="zh-CN" altLang="en-US" smtClean="0"/>
-          </a:p>
-          <a:p>
-            <a:pPr lvl="3"/>
-            <a:r>
-              <a:rPr lang="zh-CN" altLang="en-US" smtClean="0"/>
-              <a:t>第四级</a:t>
-            </a:r>
-            <a:endParaRPr lang="zh-CN" altLang="en-US" smtClean="0"/>
-          </a:p>
-          <a:p>
-            <a:pPr lvl="4"/>
-            <a:r>
-              <a:rPr lang="zh-CN" altLang="en-US" smtClean="0"/>
-              <a:t>第五级</a:t>
-            </a:r>
-            <a:endParaRPr lang="zh-CN" altLang="en-US"/>
-          </a:p>
-        </p:txBody>
-      </p:sp>
-      <p:sp>
-        <p:nvSpPr>
-          <p:cNvPr id="5" name="日期占位符 4"/>
-          <p:cNvSpPr>
-            <a:spLocks noGrp="1"/>
-          </p:cNvSpPr>
-          <p:nvPr>
-            <p:ph type="dt" sz="half" idx="10"/>
-          </p:nvPr>
-        </p:nvSpPr>
-        <p:spPr/>
-        <p:txBody>
-          <a:bodyPr/>
-          <a:lstStyle/>
-          <a:p>
-            <a:fld id="{D997B5FA-0921-464F-AAE1-844C04324D75}" type="datetimeFigureOut">
-              <a:rPr lang="zh-CN" altLang="en-US" smtClean="0"/>
+              <a:t>2024/12/23</a:t>
             </a:fld>
             <a:endParaRPr lang="zh-CN" altLang="en-US"/>
           </a:p>
@@ -1229,7 +1431,7 @@
       </p:sp>
       <p:sp>
         <p:nvSpPr>
-          <p:cNvPr id="6" name="页脚占位符 5"/>
+          <p:cNvPr id="6" name="Footer Placeholder 5"/>
           <p:cNvSpPr>
             <a:spLocks noGrp="1"/>
           </p:cNvSpPr>
@@ -1248,7 +1450,7 @@
       </p:sp>
       <p:sp>
         <p:nvSpPr>
-          <p:cNvPr id="7" name="灯片编号占位符 6"/>
+          <p:cNvPr id="7" name="Slide Number Placeholder 6"/>
           <p:cNvSpPr>
             <a:spLocks noGrp="1"/>
           </p:cNvSpPr>
@@ -1261,14 +1463,51 @@
           <a:bodyPr/>
           <a:lstStyle/>
           <a:p>
-            <a:fld id="{565CE74E-AB26-4998-AD42-012C4C1AD076}" type="slidenum">
+            <a:fld id="{FFDAE15B-D4B7-402B-A073-917161BA51E1}" type="slidenum">
               <a:rPr lang="zh-CN" altLang="en-US" smtClean="0"/>
+              <a:t>‹#›</a:t>
             </a:fld>
             <a:endParaRPr lang="zh-CN" altLang="en-US"/>
           </a:p>
         </p:txBody>
       </p:sp>
+      <p:cxnSp>
+        <p:nvCxnSpPr>
+          <p:cNvPr id="35" name="Straight Connector 34"/>
+          <p:cNvCxnSpPr/>
+          <p:nvPr/>
+        </p:nvCxnSpPr>
+        <p:spPr>
+          <a:xfrm>
+            <a:off x="1453896" y="1847088"/>
+            <a:ext cx="9607522" cy="0"/>
+          </a:xfrm>
+          <a:prstGeom prst="line">
+            <a:avLst/>
+          </a:prstGeom>
+          <a:ln w="31750"/>
+        </p:spPr>
+        <p:style>
+          <a:lnRef idx="3">
+            <a:schemeClr val="accent1"/>
+          </a:lnRef>
+          <a:fillRef idx="0">
+            <a:schemeClr val="accent1"/>
+          </a:fillRef>
+          <a:effectRef idx="2">
+            <a:schemeClr val="accent1"/>
+          </a:effectRef>
+          <a:fontRef idx="minor">
+            <a:schemeClr val="tx1"/>
+          </a:fontRef>
+        </p:style>
+      </p:cxnSp>
     </p:spTree>
+    <p:extLst>
+      <p:ext uri="{BB962C8B-B14F-4D97-AF65-F5344CB8AC3E}">
+        <p14:creationId xmlns:p14="http://schemas.microsoft.com/office/powerpoint/2010/main" val="2391999127"/>
+      </p:ext>
+    </p:extLst>
   </p:cSld>
   <p:clrMapOvr>
     <a:masterClrMapping/>
@@ -1295,7 +1534,7 @@
       </p:grpSpPr>
       <p:sp>
         <p:nvSpPr>
-          <p:cNvPr id="2" name="标题 1"/>
+          <p:cNvPr id="2" name="Title 1"/>
           <p:cNvSpPr>
             <a:spLocks noGrp="1"/>
           </p:cNvSpPr>
@@ -1305,25 +1544,25 @@
         </p:nvSpPr>
         <p:spPr>
           <a:xfrm>
-            <a:off x="839788" y="365125"/>
-            <a:ext cx="10515600" cy="1325563"/>
-          </a:xfrm>
-        </p:spPr>
-        <p:txBody>
-          <a:bodyPr/>
-          <a:lstStyle/>
-          <a:p>
-            <a:r>
-              <a:rPr lang="zh-CN" altLang="en-US" smtClean="0"/>
+            <a:off x="1447191" y="804163"/>
+            <a:ext cx="9607661" cy="1056319"/>
+          </a:xfrm>
+        </p:spPr>
+        <p:txBody>
+          <a:bodyPr/>
+          <a:lstStyle/>
+          <a:p>
+            <a:r>
+              <a:rPr lang="zh-CN" altLang="en-US"/>
               <a:t>单击此处编辑母版标题样式</a:t>
             </a:r>
-            <a:endParaRPr lang="zh-CN" altLang="en-US"/>
-          </a:p>
-        </p:txBody>
-      </p:sp>
-      <p:sp>
-        <p:nvSpPr>
-          <p:cNvPr id="3" name="文本占位符 2"/>
+            <a:endParaRPr lang="en-US" dirty="0"/>
+          </a:p>
+        </p:txBody>
+      </p:sp>
+      <p:sp>
+        <p:nvSpPr>
+          <p:cNvPr id="3" name="Text Placeholder 2"/>
           <p:cNvSpPr>
             <a:spLocks noGrp="1"/>
           </p:cNvSpPr>
@@ -1333,16 +1572,25 @@
         </p:nvSpPr>
         <p:spPr>
           <a:xfrm>
-            <a:off x="839788" y="1681163"/>
-            <a:ext cx="5157787" cy="823912"/>
-          </a:xfrm>
-        </p:spPr>
-        <p:txBody>
-          <a:bodyPr anchor="b"/>
+            <a:off x="1447191" y="2019549"/>
+            <a:ext cx="4645152" cy="801943"/>
+          </a:xfrm>
+        </p:spPr>
+        <p:txBody>
+          <a:bodyPr anchor="b">
+            <a:normAutofit/>
+          </a:bodyPr>
           <a:lstStyle>
             <a:lvl1pPr marL="0" indent="0">
-              <a:buNone/>
-              <a:defRPr sz="2400" b="1"/>
+              <a:lnSpc>
+                <a:spcPct val="100000"/>
+              </a:lnSpc>
+              <a:buNone/>
+              <a:defRPr sz="2200" b="0" cap="all" baseline="0">
+                <a:solidFill>
+                  <a:schemeClr val="accent1"/>
+                </a:solidFill>
+              </a:defRPr>
             </a:lvl1pPr>
             <a:lvl2pPr marL="457200" indent="0">
               <a:buNone/>
@@ -1380,16 +1628,15 @@
           <a:p>
             <a:pPr lvl="0"/>
             <a:r>
-              <a:rPr lang="zh-CN" altLang="en-US" smtClean="0"/>
+              <a:rPr lang="zh-CN" altLang="en-US"/>
               <a:t>单击此处编辑母版文本样式</a:t>
             </a:r>
-            <a:endParaRPr lang="zh-CN" altLang="en-US" smtClean="0"/>
-          </a:p>
-        </p:txBody>
-      </p:sp>
-      <p:sp>
-        <p:nvSpPr>
-          <p:cNvPr id="4" name="内容占位符 3"/>
+          </a:p>
+        </p:txBody>
+      </p:sp>
+      <p:sp>
+        <p:nvSpPr>
+          <p:cNvPr id="4" name="Content Placeholder 3"/>
           <p:cNvSpPr>
             <a:spLocks noGrp="1"/>
           </p:cNvSpPr>
@@ -1399,8 +1646,8 @@
         </p:nvSpPr>
         <p:spPr>
           <a:xfrm>
-            <a:off x="839788" y="2505075"/>
-            <a:ext cx="5157787" cy="3684588"/>
+            <a:off x="1447191" y="2824269"/>
+            <a:ext cx="4645152" cy="2644457"/>
           </a:xfrm>
         </p:spPr>
         <p:txBody>
@@ -1409,48 +1656,44 @@
           <a:p>
             <a:pPr lvl="0"/>
             <a:r>
-              <a:rPr lang="zh-CN" altLang="en-US" smtClean="0"/>
+              <a:rPr lang="zh-CN" altLang="en-US"/>
               <a:t>单击此处编辑母版文本样式</a:t>
             </a:r>
-            <a:endParaRPr lang="zh-CN" altLang="en-US" smtClean="0"/>
           </a:p>
           <a:p>
             <a:pPr lvl="1"/>
             <a:r>
-              <a:rPr lang="zh-CN" altLang="en-US" smtClean="0"/>
-              <a:t>第二级</a:t>
-            </a:r>
-            <a:endParaRPr lang="zh-CN" altLang="en-US" smtClean="0"/>
+              <a:rPr lang="zh-CN" altLang="en-US"/>
+              <a:t>二级</a:t>
+            </a:r>
           </a:p>
           <a:p>
             <a:pPr lvl="2"/>
             <a:r>
-              <a:rPr lang="zh-CN" altLang="en-US" smtClean="0"/>
-              <a:t>第三级</a:t>
-            </a:r>
-            <a:endParaRPr lang="zh-CN" altLang="en-US" smtClean="0"/>
+              <a:rPr lang="zh-CN" altLang="en-US"/>
+              <a:t>三级</a:t>
+            </a:r>
           </a:p>
           <a:p>
             <a:pPr lvl="3"/>
             <a:r>
-              <a:rPr lang="zh-CN" altLang="en-US" smtClean="0"/>
-              <a:t>第四级</a:t>
-            </a:r>
-            <a:endParaRPr lang="zh-CN" altLang="en-US" smtClean="0"/>
+              <a:rPr lang="zh-CN" altLang="en-US"/>
+              <a:t>四级</a:t>
+            </a:r>
           </a:p>
           <a:p>
             <a:pPr lvl="4"/>
             <a:r>
-              <a:rPr lang="zh-CN" altLang="en-US" smtClean="0"/>
-              <a:t>第五级</a:t>
-            </a:r>
-            <a:endParaRPr lang="zh-CN" altLang="en-US"/>
-          </a:p>
-        </p:txBody>
-      </p:sp>
-      <p:sp>
-        <p:nvSpPr>
-          <p:cNvPr id="5" name="文本占位符 4"/>
+              <a:rPr lang="zh-CN" altLang="en-US"/>
+              <a:t>五级</a:t>
+            </a:r>
+            <a:endParaRPr lang="en-US" dirty="0"/>
+          </a:p>
+        </p:txBody>
+      </p:sp>
+      <p:sp>
+        <p:nvSpPr>
+          <p:cNvPr id="5" name="Text Placeholder 4"/>
           <p:cNvSpPr>
             <a:spLocks noGrp="1"/>
           </p:cNvSpPr>
@@ -1460,16 +1703,25 @@
         </p:nvSpPr>
         <p:spPr>
           <a:xfrm>
-            <a:off x="6172200" y="1681163"/>
-            <a:ext cx="5183188" cy="823912"/>
-          </a:xfrm>
-        </p:spPr>
-        <p:txBody>
-          <a:bodyPr anchor="b"/>
+            <a:off x="6412362" y="2023003"/>
+            <a:ext cx="4645152" cy="802237"/>
+          </a:xfrm>
+        </p:spPr>
+        <p:txBody>
+          <a:bodyPr anchor="b">
+            <a:normAutofit/>
+          </a:bodyPr>
           <a:lstStyle>
             <a:lvl1pPr marL="0" indent="0">
-              <a:buNone/>
-              <a:defRPr sz="2400" b="1"/>
+              <a:lnSpc>
+                <a:spcPct val="100000"/>
+              </a:lnSpc>
+              <a:buNone/>
+              <a:defRPr sz="2200" b="0" cap="all" baseline="0">
+                <a:solidFill>
+                  <a:schemeClr val="accent1"/>
+                </a:solidFill>
+              </a:defRPr>
             </a:lvl1pPr>
             <a:lvl2pPr marL="457200" indent="0">
               <a:buNone/>
@@ -1507,91 +1759,87 @@
           <a:p>
             <a:pPr lvl="0"/>
             <a:r>
+              <a:rPr lang="zh-CN" altLang="en-US"/>
+              <a:t>单击此处编辑母版文本样式</a:t>
+            </a:r>
+          </a:p>
+        </p:txBody>
+      </p:sp>
+      <p:sp>
+        <p:nvSpPr>
+          <p:cNvPr id="6" name="Content Placeholder 5"/>
+          <p:cNvSpPr>
+            <a:spLocks noGrp="1"/>
+          </p:cNvSpPr>
+          <p:nvPr>
+            <p:ph sz="quarter" idx="4"/>
+          </p:nvPr>
+        </p:nvSpPr>
+        <p:spPr>
+          <a:xfrm>
+            <a:off x="6412362" y="2821491"/>
+            <a:ext cx="4645152" cy="2637371"/>
+          </a:xfrm>
+        </p:spPr>
+        <p:txBody>
+          <a:bodyPr/>
+          <a:lstStyle/>
+          <a:p>
+            <a:pPr lvl="0"/>
+            <a:r>
+              <a:rPr lang="zh-CN" altLang="en-US"/>
+              <a:t>单击此处编辑母版文本样式</a:t>
+            </a:r>
+          </a:p>
+          <a:p>
+            <a:pPr lvl="1"/>
+            <a:r>
+              <a:rPr lang="zh-CN" altLang="en-US"/>
+              <a:t>二级</a:t>
+            </a:r>
+          </a:p>
+          <a:p>
+            <a:pPr lvl="2"/>
+            <a:r>
+              <a:rPr lang="zh-CN" altLang="en-US"/>
+              <a:t>三级</a:t>
+            </a:r>
+          </a:p>
+          <a:p>
+            <a:pPr lvl="3"/>
+            <a:r>
+              <a:rPr lang="zh-CN" altLang="en-US"/>
+              <a:t>四级</a:t>
+            </a:r>
+          </a:p>
+          <a:p>
+            <a:pPr lvl="4"/>
+            <a:r>
+              <a:rPr lang="zh-CN" altLang="en-US"/>
+              <a:t>五级</a:t>
+            </a:r>
+            <a:endParaRPr lang="en-US" dirty="0"/>
+          </a:p>
+        </p:txBody>
+      </p:sp>
+      <p:sp>
+        <p:nvSpPr>
+          <p:cNvPr id="7" name="Date Placeholder 6"/>
+          <p:cNvSpPr>
+            <a:spLocks noGrp="1"/>
+          </p:cNvSpPr>
+          <p:nvPr>
+            <p:ph type="dt" sz="half" idx="10"/>
+          </p:nvPr>
+        </p:nvSpPr>
+        <p:spPr/>
+        <p:txBody>
+          <a:bodyPr/>
+          <a:lstStyle/>
+          <a:p>
+            <a:fld id="{5C9B0FD3-3389-4CA1-8F23-5BF916A8AF6E}" type="datetimeFigureOut">
               <a:rPr lang="zh-CN" altLang="en-US" smtClean="0"/>
-              <a:t>单击此处编辑母版文本样式</a:t>
-            </a:r>
-            <a:endParaRPr lang="zh-CN" altLang="en-US" smtClean="0"/>
-          </a:p>
-        </p:txBody>
-      </p:sp>
-      <p:sp>
-        <p:nvSpPr>
-          <p:cNvPr id="6" name="内容占位符 5"/>
-          <p:cNvSpPr>
-            <a:spLocks noGrp="1"/>
-          </p:cNvSpPr>
-          <p:nvPr>
-            <p:ph sz="quarter" idx="4"/>
-          </p:nvPr>
-        </p:nvSpPr>
-        <p:spPr>
-          <a:xfrm>
-            <a:off x="6172200" y="2505075"/>
-            <a:ext cx="5183188" cy="3684588"/>
-          </a:xfrm>
-        </p:spPr>
-        <p:txBody>
-          <a:bodyPr/>
-          <a:lstStyle/>
-          <a:p>
-            <a:pPr lvl="0"/>
-            <a:r>
-              <a:rPr lang="zh-CN" altLang="en-US" smtClean="0"/>
-              <a:t>单击此处编辑母版文本样式</a:t>
-            </a:r>
-            <a:endParaRPr lang="zh-CN" altLang="en-US" smtClean="0"/>
-          </a:p>
-          <a:p>
-            <a:pPr lvl="1"/>
-            <a:r>
-              <a:rPr lang="zh-CN" altLang="en-US" smtClean="0"/>
-              <a:t>第二级</a:t>
-            </a:r>
-            <a:endParaRPr lang="zh-CN" altLang="en-US" smtClean="0"/>
-          </a:p>
-          <a:p>
-            <a:pPr lvl="2"/>
-            <a:r>
-              <a:rPr lang="zh-CN" altLang="en-US" smtClean="0"/>
-              <a:t>第三级</a:t>
-            </a:r>
-            <a:endParaRPr lang="zh-CN" altLang="en-US" smtClean="0"/>
-          </a:p>
-          <a:p>
-            <a:pPr lvl="3"/>
-            <a:r>
-              <a:rPr lang="zh-CN" altLang="en-US" smtClean="0"/>
-              <a:t>第四级</a:t>
-            </a:r>
-            <a:endParaRPr lang="zh-CN" altLang="en-US" smtClean="0"/>
-          </a:p>
-          <a:p>
-            <a:pPr lvl="4"/>
-            <a:r>
-              <a:rPr lang="zh-CN" altLang="en-US" smtClean="0"/>
-              <a:t>第五级</a:t>
-            </a:r>
-            <a:endParaRPr lang="zh-CN" altLang="en-US"/>
-          </a:p>
-        </p:txBody>
-      </p:sp>
-      <p:sp>
-        <p:nvSpPr>
-          <p:cNvPr id="7" name="日期占位符 6"/>
-          <p:cNvSpPr>
-            <a:spLocks noGrp="1"/>
-          </p:cNvSpPr>
-          <p:nvPr>
-            <p:ph type="dt" sz="half" idx="10"/>
-          </p:nvPr>
-        </p:nvSpPr>
-        <p:spPr/>
-        <p:txBody>
-          <a:bodyPr/>
-          <a:lstStyle/>
-          <a:p>
-            <a:fld id="{D997B5FA-0921-464F-AAE1-844C04324D75}" type="datetimeFigureOut">
-              <a:rPr lang="zh-CN" altLang="en-US" smtClean="0"/>
+              <a:t>2024/12/23</a:t>
             </a:fld>
             <a:endParaRPr lang="zh-CN" altLang="en-US"/>
           </a:p>
@@ -1599,7 +1847,7 @@
       </p:sp>
       <p:sp>
         <p:nvSpPr>
-          <p:cNvPr id="8" name="页脚占位符 7"/>
+          <p:cNvPr id="8" name="Footer Placeholder 7"/>
           <p:cNvSpPr>
             <a:spLocks noGrp="1"/>
           </p:cNvSpPr>
@@ -1618,7 +1866,7 @@
       </p:sp>
       <p:sp>
         <p:nvSpPr>
-          <p:cNvPr id="9" name="灯片编号占位符 8"/>
+          <p:cNvPr id="9" name="Slide Number Placeholder 8"/>
           <p:cNvSpPr>
             <a:spLocks noGrp="1"/>
           </p:cNvSpPr>
@@ -1631,14 +1879,51 @@
           <a:bodyPr/>
           <a:lstStyle/>
           <a:p>
-            <a:fld id="{565CE74E-AB26-4998-AD42-012C4C1AD076}" type="slidenum">
+            <a:fld id="{FFDAE15B-D4B7-402B-A073-917161BA51E1}" type="slidenum">
               <a:rPr lang="zh-CN" altLang="en-US" smtClean="0"/>
+              <a:t>‹#›</a:t>
             </a:fld>
             <a:endParaRPr lang="zh-CN" altLang="en-US"/>
           </a:p>
         </p:txBody>
       </p:sp>
+      <p:cxnSp>
+        <p:nvCxnSpPr>
+          <p:cNvPr id="29" name="Straight Connector 28"/>
+          <p:cNvCxnSpPr/>
+          <p:nvPr/>
+        </p:nvCxnSpPr>
+        <p:spPr>
+          <a:xfrm>
+            <a:off x="1453896" y="1847088"/>
+            <a:ext cx="9607522" cy="0"/>
+          </a:xfrm>
+          <a:prstGeom prst="line">
+            <a:avLst/>
+          </a:prstGeom>
+          <a:ln w="31750"/>
+        </p:spPr>
+        <p:style>
+          <a:lnRef idx="3">
+            <a:schemeClr val="accent1"/>
+          </a:lnRef>
+          <a:fillRef idx="0">
+            <a:schemeClr val="accent1"/>
+          </a:fillRef>
+          <a:effectRef idx="2">
+            <a:schemeClr val="accent1"/>
+          </a:effectRef>
+          <a:fontRef idx="minor">
+            <a:schemeClr val="tx1"/>
+          </a:fontRef>
+        </p:style>
+      </p:cxnSp>
     </p:spTree>
+    <p:extLst>
+      <p:ext uri="{BB962C8B-B14F-4D97-AF65-F5344CB8AC3E}">
+        <p14:creationId xmlns:p14="http://schemas.microsoft.com/office/powerpoint/2010/main" val="2472396368"/>
+      </p:ext>
+    </p:extLst>
   </p:cSld>
   <p:clrMapOvr>
     <a:masterClrMapping/>
@@ -1665,7 +1950,7 @@
       </p:grpSpPr>
       <p:sp>
         <p:nvSpPr>
-          <p:cNvPr id="2" name="标题 1"/>
+          <p:cNvPr id="2" name="Title 1"/>
           <p:cNvSpPr>
             <a:spLocks noGrp="1"/>
           </p:cNvSpPr>
@@ -1679,30 +1964,31 @@
           <a:lstStyle/>
           <a:p>
             <a:r>
+              <a:rPr lang="zh-CN" altLang="en-US"/>
+              <a:t>单击此处编辑母版标题样式</a:t>
+            </a:r>
+            <a:endParaRPr lang="en-US" dirty="0"/>
+          </a:p>
+        </p:txBody>
+      </p:sp>
+      <p:sp>
+        <p:nvSpPr>
+          <p:cNvPr id="3" name="Date Placeholder 2"/>
+          <p:cNvSpPr>
+            <a:spLocks noGrp="1"/>
+          </p:cNvSpPr>
+          <p:nvPr>
+            <p:ph type="dt" sz="half" idx="10"/>
+          </p:nvPr>
+        </p:nvSpPr>
+        <p:spPr/>
+        <p:txBody>
+          <a:bodyPr/>
+          <a:lstStyle/>
+          <a:p>
+            <a:fld id="{5C9B0FD3-3389-4CA1-8F23-5BF916A8AF6E}" type="datetimeFigureOut">
               <a:rPr lang="zh-CN" altLang="en-US" smtClean="0"/>
-              <a:t>单击此处编辑母版标题样式</a:t>
-            </a:r>
-            <a:endParaRPr lang="zh-CN" altLang="en-US"/>
-          </a:p>
-        </p:txBody>
-      </p:sp>
-      <p:sp>
-        <p:nvSpPr>
-          <p:cNvPr id="3" name="日期占位符 2"/>
-          <p:cNvSpPr>
-            <a:spLocks noGrp="1"/>
-          </p:cNvSpPr>
-          <p:nvPr>
-            <p:ph type="dt" sz="half" idx="10"/>
-          </p:nvPr>
-        </p:nvSpPr>
-        <p:spPr/>
-        <p:txBody>
-          <a:bodyPr/>
-          <a:lstStyle/>
-          <a:p>
-            <a:fld id="{D997B5FA-0921-464F-AAE1-844C04324D75}" type="datetimeFigureOut">
-              <a:rPr lang="zh-CN" altLang="en-US" smtClean="0"/>
+              <a:t>2024/12/23</a:t>
             </a:fld>
             <a:endParaRPr lang="zh-CN" altLang="en-US"/>
           </a:p>
@@ -1710,7 +1996,7 @@
       </p:sp>
       <p:sp>
         <p:nvSpPr>
-          <p:cNvPr id="4" name="页脚占位符 3"/>
+          <p:cNvPr id="4" name="Footer Placeholder 3"/>
           <p:cNvSpPr>
             <a:spLocks noGrp="1"/>
           </p:cNvSpPr>
@@ -1729,7 +2015,7 @@
       </p:sp>
       <p:sp>
         <p:nvSpPr>
-          <p:cNvPr id="5" name="灯片编号占位符 4"/>
+          <p:cNvPr id="5" name="Slide Number Placeholder 4"/>
           <p:cNvSpPr>
             <a:spLocks noGrp="1"/>
           </p:cNvSpPr>
@@ -1742,14 +2028,51 @@
           <a:bodyPr/>
           <a:lstStyle/>
           <a:p>
-            <a:fld id="{565CE74E-AB26-4998-AD42-012C4C1AD076}" type="slidenum">
+            <a:fld id="{FFDAE15B-D4B7-402B-A073-917161BA51E1}" type="slidenum">
               <a:rPr lang="zh-CN" altLang="en-US" smtClean="0"/>
+              <a:t>‹#›</a:t>
             </a:fld>
             <a:endParaRPr lang="zh-CN" altLang="en-US"/>
           </a:p>
         </p:txBody>
       </p:sp>
+      <p:cxnSp>
+        <p:nvCxnSpPr>
+          <p:cNvPr id="25" name="Straight Connector 24"/>
+          <p:cNvCxnSpPr/>
+          <p:nvPr/>
+        </p:nvCxnSpPr>
+        <p:spPr>
+          <a:xfrm>
+            <a:off x="1453896" y="1847088"/>
+            <a:ext cx="9607522" cy="0"/>
+          </a:xfrm>
+          <a:prstGeom prst="line">
+            <a:avLst/>
+          </a:prstGeom>
+          <a:ln w="31750"/>
+        </p:spPr>
+        <p:style>
+          <a:lnRef idx="3">
+            <a:schemeClr val="accent1"/>
+          </a:lnRef>
+          <a:fillRef idx="0">
+            <a:schemeClr val="accent1"/>
+          </a:fillRef>
+          <a:effectRef idx="2">
+            <a:schemeClr val="accent1"/>
+          </a:effectRef>
+          <a:fontRef idx="minor">
+            <a:schemeClr val="tx1"/>
+          </a:fontRef>
+        </p:style>
+      </p:cxnSp>
     </p:spTree>
+    <p:extLst>
+      <p:ext uri="{BB962C8B-B14F-4D97-AF65-F5344CB8AC3E}">
+        <p14:creationId xmlns:p14="http://schemas.microsoft.com/office/powerpoint/2010/main" val="584306891"/>
+      </p:ext>
+    </p:extLst>
   </p:cSld>
   <p:clrMapOvr>
     <a:masterClrMapping/>
@@ -1776,7 +2099,7 @@
       </p:grpSpPr>
       <p:sp>
         <p:nvSpPr>
-          <p:cNvPr id="2" name="日期占位符 1"/>
+          <p:cNvPr id="2" name="Date Placeholder 1"/>
           <p:cNvSpPr>
             <a:spLocks noGrp="1"/>
           </p:cNvSpPr>
@@ -1789,8 +2112,9 @@
           <a:bodyPr/>
           <a:lstStyle/>
           <a:p>
-            <a:fld id="{D997B5FA-0921-464F-AAE1-844C04324D75}" type="datetimeFigureOut">
+            <a:fld id="{5C9B0FD3-3389-4CA1-8F23-5BF916A8AF6E}" type="datetimeFigureOut">
               <a:rPr lang="zh-CN" altLang="en-US" smtClean="0"/>
+              <a:t>2024/12/23</a:t>
             </a:fld>
             <a:endParaRPr lang="zh-CN" altLang="en-US"/>
           </a:p>
@@ -1798,7 +2122,7 @@
       </p:sp>
       <p:sp>
         <p:nvSpPr>
-          <p:cNvPr id="3" name="页脚占位符 2"/>
+          <p:cNvPr id="3" name="Footer Placeholder 2"/>
           <p:cNvSpPr>
             <a:spLocks noGrp="1"/>
           </p:cNvSpPr>
@@ -1817,7 +2141,7 @@
       </p:sp>
       <p:sp>
         <p:nvSpPr>
-          <p:cNvPr id="4" name="灯片编号占位符 3"/>
+          <p:cNvPr id="4" name="Slide Number Placeholder 3"/>
           <p:cNvSpPr>
             <a:spLocks noGrp="1"/>
           </p:cNvSpPr>
@@ -1830,14 +2154,20 @@
           <a:bodyPr/>
           <a:lstStyle/>
           <a:p>
-            <a:fld id="{565CE74E-AB26-4998-AD42-012C4C1AD076}" type="slidenum">
+            <a:fld id="{FFDAE15B-D4B7-402B-A073-917161BA51E1}" type="slidenum">
               <a:rPr lang="zh-CN" altLang="en-US" smtClean="0"/>
+              <a:t>‹#›</a:t>
             </a:fld>
             <a:endParaRPr lang="zh-CN" altLang="en-US"/>
           </a:p>
         </p:txBody>
       </p:sp>
     </p:spTree>
+    <p:extLst>
+      <p:ext uri="{BB962C8B-B14F-4D97-AF65-F5344CB8AC3E}">
+        <p14:creationId xmlns:p14="http://schemas.microsoft.com/office/powerpoint/2010/main" val="348804672"/>
+      </p:ext>
+    </p:extLst>
   </p:cSld>
   <p:clrMapOvr>
     <a:masterClrMapping/>
@@ -1864,7 +2194,7 @@
       </p:grpSpPr>
       <p:sp>
         <p:nvSpPr>
-          <p:cNvPr id="2" name="标题 1"/>
+          <p:cNvPr id="2" name="Title 1"/>
           <p:cNvSpPr>
             <a:spLocks noGrp="1"/>
           </p:cNvSpPr>
@@ -1874,29 +2204,31 @@
         </p:nvSpPr>
         <p:spPr>
           <a:xfrm>
-            <a:off x="839788" y="457200"/>
-            <a:ext cx="3932237" cy="1600200"/>
-          </a:xfrm>
-        </p:spPr>
-        <p:txBody>
-          <a:bodyPr anchor="b"/>
+            <a:off x="1444671" y="798973"/>
+            <a:ext cx="3273099" cy="2247117"/>
+          </a:xfrm>
+        </p:spPr>
+        <p:txBody>
+          <a:bodyPr anchor="b">
+            <a:normAutofit/>
+          </a:bodyPr>
           <a:lstStyle>
-            <a:lvl1pPr>
-              <a:defRPr sz="3200"/>
+            <a:lvl1pPr algn="l">
+              <a:defRPr sz="2400"/>
             </a:lvl1pPr>
           </a:lstStyle>
           <a:p>
             <a:r>
-              <a:rPr lang="zh-CN" altLang="en-US" smtClean="0"/>
+              <a:rPr lang="zh-CN" altLang="en-US"/>
               <a:t>单击此处编辑母版标题样式</a:t>
             </a:r>
-            <a:endParaRPr lang="zh-CN" altLang="en-US"/>
-          </a:p>
-        </p:txBody>
-      </p:sp>
-      <p:sp>
-        <p:nvSpPr>
-          <p:cNvPr id="3" name="内容占位符 2"/>
+            <a:endParaRPr lang="en-US" dirty="0"/>
+          </a:p>
+        </p:txBody>
+      </p:sp>
+      <p:sp>
+        <p:nvSpPr>
+          <p:cNvPr id="3" name="Content Placeholder 2"/>
           <p:cNvSpPr>
             <a:spLocks noGrp="1"/>
           </p:cNvSpPr>
@@ -1906,103 +2238,71 @@
         </p:nvSpPr>
         <p:spPr>
           <a:xfrm>
-            <a:off x="5183188" y="987425"/>
-            <a:ext cx="6172200" cy="4873625"/>
+            <a:off x="5043714" y="798974"/>
+            <a:ext cx="6012470" cy="4658826"/>
+          </a:xfrm>
+        </p:spPr>
+        <p:txBody>
+          <a:bodyPr anchor="ctr"/>
+          <a:lstStyle/>
+          <a:p>
+            <a:pPr lvl="0"/>
+            <a:r>
+              <a:rPr lang="zh-CN" altLang="en-US"/>
+              <a:t>单击此处编辑母版文本样式</a:t>
+            </a:r>
+          </a:p>
+          <a:p>
+            <a:pPr lvl="1"/>
+            <a:r>
+              <a:rPr lang="zh-CN" altLang="en-US"/>
+              <a:t>二级</a:t>
+            </a:r>
+          </a:p>
+          <a:p>
+            <a:pPr lvl="2"/>
+            <a:r>
+              <a:rPr lang="zh-CN" altLang="en-US"/>
+              <a:t>三级</a:t>
+            </a:r>
+          </a:p>
+          <a:p>
+            <a:pPr lvl="3"/>
+            <a:r>
+              <a:rPr lang="zh-CN" altLang="en-US"/>
+              <a:t>四级</a:t>
+            </a:r>
+          </a:p>
+          <a:p>
+            <a:pPr lvl="4"/>
+            <a:r>
+              <a:rPr lang="zh-CN" altLang="en-US"/>
+              <a:t>五级</a:t>
+            </a:r>
+            <a:endParaRPr lang="en-US" dirty="0"/>
+          </a:p>
+        </p:txBody>
+      </p:sp>
+      <p:sp>
+        <p:nvSpPr>
+          <p:cNvPr id="4" name="Text Placeholder 3"/>
+          <p:cNvSpPr>
+            <a:spLocks noGrp="1"/>
+          </p:cNvSpPr>
+          <p:nvPr>
+            <p:ph type="body" sz="half" idx="2"/>
+          </p:nvPr>
+        </p:nvSpPr>
+        <p:spPr>
+          <a:xfrm>
+            <a:off x="1444671" y="3205491"/>
+            <a:ext cx="3275013" cy="2248181"/>
           </a:xfrm>
         </p:spPr>
         <p:txBody>
           <a:bodyPr/>
           <a:lstStyle>
-            <a:lvl1pPr>
-              <a:defRPr sz="3200"/>
-            </a:lvl1pPr>
-            <a:lvl2pPr>
-              <a:defRPr sz="2800"/>
-            </a:lvl2pPr>
-            <a:lvl3pPr>
-              <a:defRPr sz="2400"/>
-            </a:lvl3pPr>
-            <a:lvl4pPr>
-              <a:defRPr sz="2000"/>
-            </a:lvl4pPr>
-            <a:lvl5pPr>
-              <a:defRPr sz="2000"/>
-            </a:lvl5pPr>
-            <a:lvl6pPr>
-              <a:defRPr sz="2000"/>
-            </a:lvl6pPr>
-            <a:lvl7pPr>
-              <a:defRPr sz="2000"/>
-            </a:lvl7pPr>
-            <a:lvl8pPr>
-              <a:defRPr sz="2000"/>
-            </a:lvl8pPr>
-            <a:lvl9pPr>
-              <a:defRPr sz="2000"/>
-            </a:lvl9pPr>
-          </a:lstStyle>
-          <a:p>
-            <a:pPr lvl="0"/>
-            <a:r>
-              <a:rPr lang="zh-CN" altLang="en-US" smtClean="0"/>
-              <a:t>单击此处编辑母版文本样式</a:t>
-            </a:r>
-            <a:endParaRPr lang="zh-CN" altLang="en-US" smtClean="0"/>
-          </a:p>
-          <a:p>
-            <a:pPr lvl="1"/>
-            <a:r>
-              <a:rPr lang="zh-CN" altLang="en-US" smtClean="0"/>
-              <a:t>第二级</a:t>
-            </a:r>
-            <a:endParaRPr lang="zh-CN" altLang="en-US" smtClean="0"/>
-          </a:p>
-          <a:p>
-            <a:pPr lvl="2"/>
-            <a:r>
-              <a:rPr lang="zh-CN" altLang="en-US" smtClean="0"/>
-              <a:t>第三级</a:t>
-            </a:r>
-            <a:endParaRPr lang="zh-CN" altLang="en-US" smtClean="0"/>
-          </a:p>
-          <a:p>
-            <a:pPr lvl="3"/>
-            <a:r>
-              <a:rPr lang="zh-CN" altLang="en-US" smtClean="0"/>
-              <a:t>第四级</a:t>
-            </a:r>
-            <a:endParaRPr lang="zh-CN" altLang="en-US" smtClean="0"/>
-          </a:p>
-          <a:p>
-            <a:pPr lvl="4"/>
-            <a:r>
-              <a:rPr lang="zh-CN" altLang="en-US" smtClean="0"/>
-              <a:t>第五级</a:t>
-            </a:r>
-            <a:endParaRPr lang="zh-CN" altLang="en-US"/>
-          </a:p>
-        </p:txBody>
-      </p:sp>
-      <p:sp>
-        <p:nvSpPr>
-          <p:cNvPr id="4" name="文本占位符 3"/>
-          <p:cNvSpPr>
-            <a:spLocks noGrp="1"/>
-          </p:cNvSpPr>
-          <p:nvPr>
-            <p:ph type="body" sz="half" idx="2"/>
-          </p:nvPr>
-        </p:nvSpPr>
-        <p:spPr>
-          <a:xfrm>
-            <a:off x="839788" y="2057400"/>
-            <a:ext cx="3932237" cy="3811588"/>
-          </a:xfrm>
-        </p:spPr>
-        <p:txBody>
-          <a:bodyPr/>
-          <a:lstStyle>
-            <a:lvl1pPr marL="0" indent="0">
+            <a:lvl1pPr marL="0" indent="0" algn="l">
               <a:buNone/>
               <a:defRPr sz="1600"/>
             </a:lvl1pPr>
@@ -2042,30 +2342,30 @@
           <a:p>
             <a:pPr lvl="0"/>
             <a:r>
+              <a:rPr lang="zh-CN" altLang="en-US"/>
+              <a:t>单击此处编辑母版文本样式</a:t>
+            </a:r>
+          </a:p>
+        </p:txBody>
+      </p:sp>
+      <p:sp>
+        <p:nvSpPr>
+          <p:cNvPr id="5" name="Date Placeholder 4"/>
+          <p:cNvSpPr>
+            <a:spLocks noGrp="1"/>
+          </p:cNvSpPr>
+          <p:nvPr>
+            <p:ph type="dt" sz="half" idx="10"/>
+          </p:nvPr>
+        </p:nvSpPr>
+        <p:spPr/>
+        <p:txBody>
+          <a:bodyPr/>
+          <a:lstStyle/>
+          <a:p>
+            <a:fld id="{5C9B0FD3-3389-4CA1-8F23-5BF916A8AF6E}" type="datetimeFigureOut">
               <a:rPr lang="zh-CN" altLang="en-US" smtClean="0"/>
-              <a:t>单击此处编辑母版文本样式</a:t>
-            </a:r>
-            <a:endParaRPr lang="zh-CN" altLang="en-US" smtClean="0"/>
-          </a:p>
-        </p:txBody>
-      </p:sp>
-      <p:sp>
-        <p:nvSpPr>
-          <p:cNvPr id="5" name="日期占位符 4"/>
-          <p:cNvSpPr>
-            <a:spLocks noGrp="1"/>
-          </p:cNvSpPr>
-          <p:nvPr>
-            <p:ph type="dt" sz="half" idx="10"/>
-          </p:nvPr>
-        </p:nvSpPr>
-        <p:spPr/>
-        <p:txBody>
-          <a:bodyPr/>
-          <a:lstStyle/>
-          <a:p>
-            <a:fld id="{D997B5FA-0921-464F-AAE1-844C04324D75}" type="datetimeFigureOut">
-              <a:rPr lang="zh-CN" altLang="en-US" smtClean="0"/>
+              <a:t>2024/12/23</a:t>
             </a:fld>
             <a:endParaRPr lang="zh-CN" altLang="en-US"/>
           </a:p>
@@ -2073,7 +2373,7 @@
       </p:sp>
       <p:sp>
         <p:nvSpPr>
-          <p:cNvPr id="6" name="页脚占位符 5"/>
+          <p:cNvPr id="6" name="Footer Placeholder 5"/>
           <p:cNvSpPr>
             <a:spLocks noGrp="1"/>
           </p:cNvSpPr>
@@ -2092,7 +2392,7 @@
       </p:sp>
       <p:sp>
         <p:nvSpPr>
-          <p:cNvPr id="7" name="灯片编号占位符 6"/>
+          <p:cNvPr id="7" name="Slide Number Placeholder 6"/>
           <p:cNvSpPr>
             <a:spLocks noGrp="1"/>
           </p:cNvSpPr>
@@ -2105,14 +2405,51 @@
           <a:bodyPr/>
           <a:lstStyle/>
           <a:p>
-            <a:fld id="{565CE74E-AB26-4998-AD42-012C4C1AD076}" type="slidenum">
+            <a:fld id="{FFDAE15B-D4B7-402B-A073-917161BA51E1}" type="slidenum">
               <a:rPr lang="zh-CN" altLang="en-US" smtClean="0"/>
+              <a:t>‹#›</a:t>
             </a:fld>
             <a:endParaRPr lang="zh-CN" altLang="en-US"/>
           </a:p>
         </p:txBody>
       </p:sp>
+      <p:cxnSp>
+        <p:nvCxnSpPr>
+          <p:cNvPr id="17" name="Straight Connector 16"/>
+          <p:cNvCxnSpPr/>
+          <p:nvPr/>
+        </p:nvCxnSpPr>
+        <p:spPr>
+          <a:xfrm>
+            <a:off x="1448280" y="3205491"/>
+            <a:ext cx="3269490" cy="0"/>
+          </a:xfrm>
+          <a:prstGeom prst="line">
+            <a:avLst/>
+          </a:prstGeom>
+          <a:ln w="31750"/>
+        </p:spPr>
+        <p:style>
+          <a:lnRef idx="3">
+            <a:schemeClr val="accent1"/>
+          </a:lnRef>
+          <a:fillRef idx="0">
+            <a:schemeClr val="accent1"/>
+          </a:fillRef>
+          <a:effectRef idx="2">
+            <a:schemeClr val="accent1"/>
+          </a:effectRef>
+          <a:fontRef idx="minor">
+            <a:schemeClr val="tx1"/>
+          </a:fontRef>
+        </p:style>
+      </p:cxnSp>
     </p:spTree>
+    <p:extLst>
+      <p:ext uri="{BB962C8B-B14F-4D97-AF65-F5344CB8AC3E}">
+        <p14:creationId xmlns:p14="http://schemas.microsoft.com/office/powerpoint/2010/main" val="4153586171"/>
+      </p:ext>
+    </p:extLst>
   </p:cSld>
   <p:clrMapOvr>
     <a:masterClrMapping/>
@@ -2137,9 +2474,143 @@
           <a:chExt cx="0" cy="0"/>
         </a:xfrm>
       </p:grpSpPr>
-      <p:sp>
-        <p:nvSpPr>
-          <p:cNvPr id="2" name="标题 1"/>
+      <p:grpSp>
+        <p:nvGrpSpPr>
+          <p:cNvPr id="8" name="Group 7"/>
+          <p:cNvGrpSpPr/>
+          <p:nvPr/>
+        </p:nvGrpSpPr>
+        <p:grpSpPr>
+          <a:xfrm>
+            <a:off x="7477387" y="482170"/>
+            <a:ext cx="4074533" cy="5149101"/>
+            <a:chOff x="7477387" y="482170"/>
+            <a:chExt cx="4074533" cy="5149101"/>
+          </a:xfrm>
+        </p:grpSpPr>
+        <p:sp>
+          <p:nvSpPr>
+            <p:cNvPr id="18" name="Rectangle 17"/>
+            <p:cNvSpPr/>
+            <p:nvPr/>
+          </p:nvSpPr>
+          <p:spPr bwMode="black">
+            <a:xfrm>
+              <a:off x="7477387" y="482170"/>
+              <a:ext cx="4074533" cy="5149101"/>
+            </a:xfrm>
+            <a:prstGeom prst="rect">
+              <a:avLst/>
+            </a:prstGeom>
+            <a:gradFill>
+              <a:gsLst>
+                <a:gs pos="0">
+                  <a:srgbClr val="000001"/>
+                </a:gs>
+                <a:gs pos="100000">
+                  <a:srgbClr val="191919"/>
+                </a:gs>
+              </a:gsLst>
+            </a:gradFill>
+            <a:ln w="76200" cmpd="sng">
+              <a:noFill/>
+              <a:miter lim="800000"/>
+            </a:ln>
+            <a:effectLst>
+              <a:outerShdw blurRad="127000" dist="228600" dir="4740000" sx="98000" sy="98000" algn="tl" rotWithShape="0">
+                <a:srgbClr val="000000">
+                  <a:alpha val="34000"/>
+                </a:srgbClr>
+              </a:outerShdw>
+            </a:effectLst>
+            <a:scene3d>
+              <a:camera prst="orthographicFront"/>
+              <a:lightRig rig="threePt" dir="t"/>
+            </a:scene3d>
+            <a:sp3d>
+              <a:bevelT w="152400" h="50800" prst="softRound"/>
+            </a:sp3d>
+          </p:spPr>
+          <p:style>
+            <a:lnRef idx="1">
+              <a:schemeClr val="accent1"/>
+            </a:lnRef>
+            <a:fillRef idx="3">
+              <a:schemeClr val="accent1"/>
+            </a:fillRef>
+            <a:effectRef idx="2">
+              <a:schemeClr val="accent1"/>
+            </a:effectRef>
+            <a:fontRef idx="minor">
+              <a:schemeClr val="lt1"/>
+            </a:fontRef>
+          </p:style>
+        </p:sp>
+        <p:sp>
+          <p:nvSpPr>
+            <p:cNvPr id="19" name="Rectangle 18"/>
+            <p:cNvSpPr/>
+            <p:nvPr/>
+          </p:nvSpPr>
+          <p:spPr bwMode="blackWhite">
+            <a:xfrm>
+              <a:off x="7790446" y="812506"/>
+              <a:ext cx="3450289" cy="4466452"/>
+            </a:xfrm>
+            <a:prstGeom prst="rect">
+              <a:avLst/>
+            </a:prstGeom>
+            <a:gradFill>
+              <a:gsLst>
+                <a:gs pos="0">
+                  <a:srgbClr val="DADADA"/>
+                </a:gs>
+                <a:gs pos="100000">
+                  <a:srgbClr val="FFFFFE"/>
+                </a:gs>
+              </a:gsLst>
+              <a:lin ang="16200000" scaled="0"/>
+            </a:gradFill>
+            <a:ln w="50800" cmpd="sng">
+              <a:solidFill>
+                <a:srgbClr val="191919"/>
+              </a:solidFill>
+              <a:miter lim="800000"/>
+            </a:ln>
+            <a:effectLst>
+              <a:innerShdw blurRad="63500" dist="88900" dir="14100000">
+                <a:srgbClr val="000000">
+                  <a:alpha val="30000"/>
+                </a:srgbClr>
+              </a:innerShdw>
+            </a:effectLst>
+            <a:scene3d>
+              <a:camera prst="orthographicFront"/>
+              <a:lightRig rig="threePt" dir="t"/>
+            </a:scene3d>
+            <a:sp3d>
+              <a:bevelT prst="relaxedInset"/>
+            </a:sp3d>
+          </p:spPr>
+          <p:style>
+            <a:lnRef idx="1">
+              <a:schemeClr val="accent1"/>
+            </a:lnRef>
+            <a:fillRef idx="3">
+              <a:schemeClr val="accent1"/>
+            </a:fillRef>
+            <a:effectRef idx="2">
+              <a:schemeClr val="accent1"/>
+            </a:effectRef>
+            <a:fontRef idx="minor">
+              <a:schemeClr val="lt1"/>
+            </a:fontRef>
+          </p:style>
+        </p:sp>
+      </p:grpSp>
+      <p:sp>
+        <p:nvSpPr>
+          <p:cNvPr id="2" name="Title 1"/>
           <p:cNvSpPr>
             <a:spLocks noGrp="1"/>
           </p:cNvSpPr>
@@ -2149,12 +2620,14 @@
         </p:nvSpPr>
         <p:spPr>
           <a:xfrm>
-            <a:off x="839788" y="457200"/>
-            <a:ext cx="3932237" cy="1600200"/>
-          </a:xfrm>
-        </p:spPr>
-        <p:txBody>
-          <a:bodyPr anchor="b"/>
+            <a:off x="1451206" y="1129513"/>
+            <a:ext cx="5532328" cy="1830584"/>
+          </a:xfrm>
+        </p:spPr>
+        <p:txBody>
+          <a:bodyPr anchor="b">
+            <a:normAutofit/>
+          </a:bodyPr>
           <a:lstStyle>
             <a:lvl1pPr>
               <a:defRPr sz="3200"/>
@@ -2162,18 +2635,18 @@
           </a:lstStyle>
           <a:p>
             <a:r>
-              <a:rPr lang="zh-CN" altLang="en-US" smtClean="0"/>
+              <a:rPr lang="zh-CN" altLang="en-US"/>
               <a:t>单击此处编辑母版标题样式</a:t>
             </a:r>
-            <a:endParaRPr lang="zh-CN" altLang="en-US"/>
-          </a:p>
-        </p:txBody>
-      </p:sp>
-      <p:sp>
-        <p:nvSpPr>
-          <p:cNvPr id="3" name="图片占位符 2"/>
-          <p:cNvSpPr>
-            <a:spLocks noGrp="1"/>
+            <a:endParaRPr lang="en-US" dirty="0"/>
+          </a:p>
+        </p:txBody>
+      </p:sp>
+      <p:sp>
+        <p:nvSpPr>
+          <p:cNvPr id="3" name="Picture Placeholder 2"/>
+          <p:cNvSpPr>
+            <a:spLocks noGrp="1" noChangeAspect="1"/>
           </p:cNvSpPr>
           <p:nvPr>
             <p:ph type="pic" idx="1"/>
@@ -2181,14 +2654,24 @@
         </p:nvSpPr>
         <p:spPr>
           <a:xfrm>
-            <a:off x="5183188" y="987425"/>
-            <a:ext cx="6172200" cy="4873625"/>
-          </a:xfrm>
-        </p:spPr>
-        <p:txBody>
-          <a:bodyPr/>
+            <a:off x="8124389" y="1122542"/>
+            <a:ext cx="2791171" cy="3866327"/>
+          </a:xfrm>
+          <a:solidFill>
+            <a:schemeClr val="bg1">
+              <a:lumMod val="85000"/>
+            </a:schemeClr>
+          </a:solidFill>
+          <a:ln w="9525" cap="sq">
+            <a:noFill/>
+            <a:miter lim="800000"/>
+          </a:ln>
+          <a:effectLst/>
+        </p:spPr>
+        <p:txBody>
+          <a:bodyPr anchor="t"/>
           <a:lstStyle>
-            <a:lvl1pPr marL="0" indent="0">
+            <a:lvl1pPr marL="0" indent="0" algn="ctr">
               <a:buNone/>
               <a:defRPr sz="3200"/>
             </a:lvl1pPr>
@@ -2226,13 +2709,17 @@
             </a:lvl9pPr>
           </a:lstStyle>
           <a:p>
-            <a:endParaRPr lang="zh-CN" altLang="en-US"/>
-          </a:p>
-        </p:txBody>
-      </p:sp>
-      <p:sp>
-        <p:nvSpPr>
-          <p:cNvPr id="4" name="文本占位符 3"/>
+            <a:r>
+              <a:rPr lang="zh-CN" altLang="en-US"/>
+              <a:t>单击图标添加图片</a:t>
+            </a:r>
+            <a:endParaRPr lang="en-US" dirty="0"/>
+          </a:p>
+        </p:txBody>
+      </p:sp>
+      <p:sp>
+        <p:nvSpPr>
+          <p:cNvPr id="4" name="Text Placeholder 3"/>
           <p:cNvSpPr>
             <a:spLocks noGrp="1"/>
           </p:cNvSpPr>
@@ -2242,16 +2729,18 @@
         </p:nvSpPr>
         <p:spPr>
           <a:xfrm>
-            <a:off x="839788" y="2057400"/>
-            <a:ext cx="3932237" cy="3811588"/>
-          </a:xfrm>
-        </p:spPr>
-        <p:txBody>
-          <a:bodyPr/>
+            <a:off x="1450329" y="3145992"/>
+            <a:ext cx="5524404" cy="2003742"/>
+          </a:xfrm>
+        </p:spPr>
+        <p:txBody>
+          <a:bodyPr>
+            <a:normAutofit/>
+          </a:bodyPr>
           <a:lstStyle>
-            <a:lvl1pPr marL="0" indent="0">
-              <a:buNone/>
-              <a:defRPr sz="1600"/>
+            <a:lvl1pPr marL="0" indent="0" algn="l">
+              <a:buNone/>
+              <a:defRPr sz="1800"/>
             </a:lvl1pPr>
             <a:lvl2pPr marL="457200" indent="0">
               <a:buNone/>
@@ -2289,30 +2778,39 @@
           <a:p>
             <a:pPr lvl="0"/>
             <a:r>
+              <a:rPr lang="zh-CN" altLang="en-US"/>
+              <a:t>单击此处编辑母版文本样式</a:t>
+            </a:r>
+          </a:p>
+        </p:txBody>
+      </p:sp>
+      <p:sp>
+        <p:nvSpPr>
+          <p:cNvPr id="5" name="Date Placeholder 4"/>
+          <p:cNvSpPr>
+            <a:spLocks noGrp="1"/>
+          </p:cNvSpPr>
+          <p:nvPr>
+            <p:ph type="dt" sz="half" idx="10"/>
+          </p:nvPr>
+        </p:nvSpPr>
+        <p:spPr>
+          <a:xfrm>
+            <a:off x="1447382" y="5469856"/>
+            <a:ext cx="5527351" cy="320123"/>
+          </a:xfrm>
+        </p:spPr>
+        <p:txBody>
+          <a:bodyPr/>
+          <a:lstStyle>
+            <a:lvl1pPr algn="l">
+              <a:defRPr/>
+            </a:lvl1pPr>
+          </a:lstStyle>
+          <a:p>
+            <a:fld id="{5C9B0FD3-3389-4CA1-8F23-5BF916A8AF6E}" type="datetimeFigureOut">
               <a:rPr lang="zh-CN" altLang="en-US" smtClean="0"/>
-              <a:t>单击此处编辑母版文本样式</a:t>
-            </a:r>
-            <a:endParaRPr lang="zh-CN" altLang="en-US" smtClean="0"/>
-          </a:p>
-        </p:txBody>
-      </p:sp>
-      <p:sp>
-        <p:nvSpPr>
-          <p:cNvPr id="5" name="日期占位符 4"/>
-          <p:cNvSpPr>
-            <a:spLocks noGrp="1"/>
-          </p:cNvSpPr>
-          <p:nvPr>
-            <p:ph type="dt" sz="half" idx="10"/>
-          </p:nvPr>
-        </p:nvSpPr>
-        <p:spPr/>
-        <p:txBody>
-          <a:bodyPr/>
-          <a:lstStyle/>
-          <a:p>
-            <a:fld id="{D997B5FA-0921-464F-AAE1-844C04324D75}" type="datetimeFigureOut">
-              <a:rPr lang="zh-CN" altLang="en-US" smtClean="0"/>
+              <a:t>2024/12/23</a:t>
             </a:fld>
             <a:endParaRPr lang="zh-CN" altLang="en-US"/>
           </a:p>
@@ -2320,7 +2818,7 @@
       </p:sp>
       <p:sp>
         <p:nvSpPr>
-          <p:cNvPr id="6" name="页脚占位符 5"/>
+          <p:cNvPr id="6" name="Footer Placeholder 5"/>
           <p:cNvSpPr>
             <a:spLocks noGrp="1"/>
           </p:cNvSpPr>
@@ -2328,38 +2826,80 @@
             <p:ph type="ftr" sz="quarter" idx="11"/>
           </p:nvPr>
         </p:nvSpPr>
+        <p:spPr>
+          <a:xfrm>
+            <a:off x="1447382" y="318640"/>
+            <a:ext cx="5541004" cy="320931"/>
+          </a:xfrm>
+        </p:spPr>
+        <p:txBody>
+          <a:bodyPr/>
+          <a:lstStyle/>
+          <a:p>
+            <a:endParaRPr lang="zh-CN" altLang="en-US"/>
+          </a:p>
+        </p:txBody>
+      </p:sp>
+      <p:sp>
+        <p:nvSpPr>
+          <p:cNvPr id="7" name="Slide Number Placeholder 6"/>
+          <p:cNvSpPr>
+            <a:spLocks noGrp="1"/>
+          </p:cNvSpPr>
+          <p:nvPr>
+            <p:ph type="sldNum" sz="quarter" idx="12"/>
+          </p:nvPr>
+        </p:nvSpPr>
         <p:spPr/>
         <p:txBody>
           <a:bodyPr/>
           <a:lstStyle/>
           <a:p>
-            <a:endParaRPr lang="zh-CN" altLang="en-US"/>
-          </a:p>
-        </p:txBody>
-      </p:sp>
-      <p:sp>
-        <p:nvSpPr>
-          <p:cNvPr id="7" name="灯片编号占位符 6"/>
-          <p:cNvSpPr>
-            <a:spLocks noGrp="1"/>
-          </p:cNvSpPr>
-          <p:nvPr>
-            <p:ph type="sldNum" sz="quarter" idx="12"/>
-          </p:nvPr>
-        </p:nvSpPr>
-        <p:spPr/>
-        <p:txBody>
-          <a:bodyPr/>
-          <a:lstStyle/>
-          <a:p>
-            <a:fld id="{565CE74E-AB26-4998-AD42-012C4C1AD076}" type="slidenum">
+            <a:fld id="{FFDAE15B-D4B7-402B-A073-917161BA51E1}" type="slidenum">
               <a:rPr lang="zh-CN" altLang="en-US" smtClean="0"/>
+              <a:t>‹#›</a:t>
             </a:fld>
             <a:endParaRPr lang="zh-CN" altLang="en-US"/>
           </a:p>
         </p:txBody>
       </p:sp>
+      <p:cxnSp>
+        <p:nvCxnSpPr>
+          <p:cNvPr id="31" name="Straight Connector 30"/>
+          <p:cNvCxnSpPr/>
+          <p:nvPr/>
+        </p:nvCxnSpPr>
+        <p:spPr>
+          <a:xfrm>
+            <a:off x="1447382" y="3143605"/>
+            <a:ext cx="5527351" cy="0"/>
+          </a:xfrm>
+          <a:prstGeom prst="line">
+            <a:avLst/>
+          </a:prstGeom>
+          <a:ln w="31750"/>
+        </p:spPr>
+        <p:style>
+          <a:lnRef idx="3">
+            <a:schemeClr val="accent1"/>
+          </a:lnRef>
+          <a:fillRef idx="0">
+            <a:schemeClr val="accent1"/>
+          </a:fillRef>
+          <a:effectRef idx="2">
+            <a:schemeClr val="accent1"/>
+          </a:effectRef>
+          <a:fontRef idx="minor">
+            <a:schemeClr val="tx1"/>
+          </a:fontRef>
+        </p:style>
+      </p:cxnSp>
     </p:spTree>
+    <p:extLst>
+      <p:ext uri="{BB962C8B-B14F-4D97-AF65-F5344CB8AC3E}">
+        <p14:creationId xmlns:p14="http://schemas.microsoft.com/office/powerpoint/2010/main" val="1287613497"/>
+      </p:ext>
+    </p:extLst>
   </p:cSld>
   <p:clrMapOvr>
     <a:masterClrMapping/>
@@ -2371,8 +2911,8 @@
 <p:sldMaster xmlns:a="http://schemas.openxmlformats.org/drawingml/2006/main" xmlns:r="http://schemas.openxmlformats.org/officeDocument/2006/relationships" xmlns:p="http://schemas.openxmlformats.org/presentationml/2006/main">
   <p:cSld>
     <p:bg>
-      <p:bgRef idx="1001">
-        <a:schemeClr val="bg1"/>
+      <p:bgRef idx="1003">
+        <a:schemeClr val="bg2"/>
       </p:bgRef>
     </p:bg>
     <p:spTree>
@@ -2391,56 +2931,134 @@
       </p:grpSpPr>
       <p:sp>
         <p:nvSpPr>
-          <p:cNvPr id="2" name="标题占位符 1"/>
-          <p:cNvSpPr>
-            <a:spLocks noGrp="1"/>
-          </p:cNvSpPr>
-          <p:nvPr>
-            <p:ph type="title"/>
-          </p:nvPr>
-        </p:nvSpPr>
-        <p:spPr>
-          <a:xfrm>
-            <a:off x="838200" y="365125"/>
-            <a:ext cx="10515600" cy="1325563"/>
+          <p:cNvPr id="8" name="Rectangle 7"/>
+          <p:cNvSpPr/>
+          <p:nvPr/>
+        </p:nvSpPr>
+        <p:spPr>
+          <a:xfrm>
+            <a:off x="0" y="2019476"/>
+            <a:ext cx="12192000" cy="4105941"/>
           </a:xfrm>
           <a:prstGeom prst="rect">
             <a:avLst/>
           </a:prstGeom>
-        </p:spPr>
-        <p:txBody>
-          <a:bodyPr vert="horz" lIns="91440" tIns="45720" rIns="91440" bIns="45720" rtlCol="0" anchor="ctr">
-            <a:normAutofit/>
-          </a:bodyPr>
-          <a:lstStyle/>
-          <a:p>
-            <a:r>
-              <a:rPr lang="zh-CN" altLang="en-US" smtClean="0"/>
-              <a:t>单击此处编辑母版标题样式</a:t>
-            </a:r>
-            <a:endParaRPr lang="zh-CN" altLang="en-US"/>
-          </a:p>
-        </p:txBody>
-      </p:sp>
-      <p:sp>
-        <p:nvSpPr>
-          <p:cNvPr id="3" name="文本占位符 2"/>
-          <p:cNvSpPr>
-            <a:spLocks noGrp="1"/>
-          </p:cNvSpPr>
-          <p:nvPr>
-            <p:ph type="body" idx="1"/>
-          </p:nvPr>
-        </p:nvSpPr>
-        <p:spPr>
-          <a:xfrm>
-            <a:off x="838200" y="1825625"/>
-            <a:ext cx="10515600" cy="4351338"/>
+          <a:gradFill flip="none" rotWithShape="1">
+            <a:gsLst>
+              <a:gs pos="0">
+                <a:schemeClr val="bg2">
+                  <a:alpha val="0"/>
+                </a:schemeClr>
+              </a:gs>
+              <a:gs pos="100000">
+                <a:schemeClr val="bg2"/>
+              </a:gs>
+            </a:gsLst>
+            <a:lin ang="5400000" scaled="0"/>
+            <a:tileRect/>
+          </a:gradFill>
+          <a:ln>
+            <a:noFill/>
+          </a:ln>
+        </p:spPr>
+        <p:style>
+          <a:lnRef idx="2">
+            <a:schemeClr val="accent1">
+              <a:shade val="50000"/>
+            </a:schemeClr>
+          </a:lnRef>
+          <a:fillRef idx="1">
+            <a:schemeClr val="accent1"/>
+          </a:fillRef>
+          <a:effectRef idx="0">
+            <a:schemeClr val="accent1"/>
+          </a:effectRef>
+          <a:fontRef idx="minor">
+            <a:schemeClr val="lt1"/>
+          </a:fontRef>
+        </p:style>
+      </p:sp>
+      <p:pic>
+        <p:nvPicPr>
+          <p:cNvPr id="7" name="Picture 6"/>
+          <p:cNvPicPr>
+            <a:picLocks noChangeAspect="1"/>
+          </p:cNvPicPr>
+          <p:nvPr/>
+        </p:nvPicPr>
+        <p:blipFill rotWithShape="1">
+          <a:blip r:embed="rId13">
+            <a:extLst>
+              <a:ext uri="{28A0092B-C50C-407E-A947-70E740481C1C}">
+                <a14:useLocalDpi xmlns:a14="http://schemas.microsoft.com/office/drawing/2010/main" val="0"/>
+              </a:ext>
+            </a:extLst>
+          </a:blip>
+          <a:srcRect t="1538" b="-1538"/>
+          <a:stretch/>
+        </p:blipFill>
+        <p:spPr bwMode="black">
+          <a:xfrm>
+            <a:off x="0" y="6126480"/>
+            <a:ext cx="12192000" cy="742950"/>
           </a:xfrm>
           <a:prstGeom prst="rect">
             <a:avLst/>
           </a:prstGeom>
         </p:spPr>
+      </p:pic>
+      <p:sp>
+        <p:nvSpPr>
+          <p:cNvPr id="2" name="Title Placeholder 1"/>
+          <p:cNvSpPr>
+            <a:spLocks noGrp="1"/>
+          </p:cNvSpPr>
+          <p:nvPr>
+            <p:ph type="title"/>
+          </p:nvPr>
+        </p:nvSpPr>
+        <p:spPr>
+          <a:xfrm>
+            <a:off x="1451579" y="804519"/>
+            <a:ext cx="9603275" cy="1049235"/>
+          </a:xfrm>
+          <a:prstGeom prst="rect">
+            <a:avLst/>
+          </a:prstGeom>
+        </p:spPr>
+        <p:txBody>
+          <a:bodyPr vert="horz" lIns="91440" tIns="45720" rIns="91440" bIns="45720" rtlCol="0" anchor="t">
+            <a:normAutofit/>
+          </a:bodyPr>
+          <a:lstStyle/>
+          <a:p>
+            <a:r>
+              <a:rPr lang="zh-CN" altLang="en-US"/>
+              <a:t>单击此处编辑母版标题样式</a:t>
+            </a:r>
+            <a:endParaRPr lang="en-US" dirty="0"/>
+          </a:p>
+        </p:txBody>
+      </p:sp>
+      <p:sp>
+        <p:nvSpPr>
+          <p:cNvPr id="3" name="Text Placeholder 2"/>
+          <p:cNvSpPr>
+            <a:spLocks noGrp="1"/>
+          </p:cNvSpPr>
+          <p:nvPr>
+            <p:ph type="body" idx="1"/>
+          </p:nvPr>
+        </p:nvSpPr>
+        <p:spPr>
+          <a:xfrm>
+            <a:off x="1451579" y="2015732"/>
+            <a:ext cx="9603275" cy="3450613"/>
+          </a:xfrm>
+          <a:prstGeom prst="rect">
+            <a:avLst/>
+          </a:prstGeom>
+        </p:spPr>
         <p:txBody>
           <a:bodyPr vert="horz" lIns="91440" tIns="45720" rIns="91440" bIns="45720" rtlCol="0">
             <a:normAutofit/>
@@ -2449,48 +3067,44 @@
           <a:p>
             <a:pPr lvl="0"/>
             <a:r>
-              <a:rPr lang="zh-CN" altLang="en-US" smtClean="0"/>
+              <a:rPr lang="zh-CN" altLang="en-US"/>
               <a:t>单击此处编辑母版文本样式</a:t>
             </a:r>
-            <a:endParaRPr lang="zh-CN" altLang="en-US" smtClean="0"/>
           </a:p>
           <a:p>
             <a:pPr lvl="1"/>
             <a:r>
-              <a:rPr lang="zh-CN" altLang="en-US" smtClean="0"/>
-              <a:t>第二级</a:t>
-            </a:r>
-            <a:endParaRPr lang="zh-CN" altLang="en-US" smtClean="0"/>
+              <a:rPr lang="zh-CN" altLang="en-US"/>
+              <a:t>二级</a:t>
+            </a:r>
           </a:p>
           <a:p>
             <a:pPr lvl="2"/>
             <a:r>
-              <a:rPr lang="zh-CN" altLang="en-US" smtClean="0"/>
-              <a:t>第三级</a:t>
-            </a:r>
-            <a:endParaRPr lang="zh-CN" altLang="en-US" smtClean="0"/>
+              <a:rPr lang="zh-CN" altLang="en-US"/>
+              <a:t>三级</a:t>
+            </a:r>
           </a:p>
           <a:p>
             <a:pPr lvl="3"/>
             <a:r>
-              <a:rPr lang="zh-CN" altLang="en-US" smtClean="0"/>
-              <a:t>第四级</a:t>
-            </a:r>
-            <a:endParaRPr lang="zh-CN" altLang="en-US" smtClean="0"/>
+              <a:rPr lang="zh-CN" altLang="en-US"/>
+              <a:t>四级</a:t>
+            </a:r>
           </a:p>
           <a:p>
             <a:pPr lvl="4"/>
             <a:r>
-              <a:rPr lang="zh-CN" altLang="en-US" smtClean="0"/>
-              <a:t>第五级</a:t>
-            </a:r>
-            <a:endParaRPr lang="zh-CN" altLang="en-US"/>
-          </a:p>
-        </p:txBody>
-      </p:sp>
-      <p:sp>
-        <p:nvSpPr>
-          <p:cNvPr id="4" name="日期占位符 3"/>
+              <a:rPr lang="zh-CN" altLang="en-US"/>
+              <a:t>五级</a:t>
+            </a:r>
+            <a:endParaRPr lang="en-US" dirty="0"/>
+          </a:p>
+        </p:txBody>
+      </p:sp>
+      <p:sp>
+        <p:nvSpPr>
+          <p:cNvPr id="4" name="Date Placeholder 3"/>
           <p:cNvSpPr>
             <a:spLocks noGrp="1"/>
           </p:cNvSpPr>
@@ -2500,8 +3114,8 @@
         </p:nvSpPr>
         <p:spPr>
           <a:xfrm>
-            <a:off x="838200" y="6356350"/>
-            <a:ext cx="2743200" cy="365125"/>
+            <a:off x="7554138" y="330370"/>
+            <a:ext cx="3500715" cy="309201"/>
           </a:xfrm>
           <a:prstGeom prst="rect">
             <a:avLst/>
@@ -2510,8 +3124,8 @@
         <p:txBody>
           <a:bodyPr vert="horz" lIns="91440" tIns="45720" rIns="91440" bIns="45720" rtlCol="0" anchor="ctr"/>
           <a:lstStyle>
-            <a:lvl1pPr algn="l">
-              <a:defRPr sz="1200">
+            <a:lvl1pPr algn="r">
+              <a:defRPr sz="1000">
                 <a:solidFill>
                   <a:schemeClr val="tx1">
                     <a:tint val="75000"/>
@@ -2521,8 +3135,9 @@
             </a:lvl1pPr>
           </a:lstStyle>
           <a:p>
-            <a:fld id="{D997B5FA-0921-464F-AAE1-844C04324D75}" type="datetimeFigureOut">
+            <a:fld id="{5C9B0FD3-3389-4CA1-8F23-5BF916A8AF6E}" type="datetimeFigureOut">
               <a:rPr lang="zh-CN" altLang="en-US" smtClean="0"/>
+              <a:t>2024/12/23</a:t>
             </a:fld>
             <a:endParaRPr lang="zh-CN" altLang="en-US"/>
           </a:p>
@@ -2530,7 +3145,7 @@
       </p:sp>
       <p:sp>
         <p:nvSpPr>
-          <p:cNvPr id="5" name="页脚占位符 4"/>
+          <p:cNvPr id="5" name="Footer Placeholder 4"/>
           <p:cNvSpPr>
             <a:spLocks noGrp="1"/>
           </p:cNvSpPr>
@@ -2540,8 +3155,8 @@
         </p:nvSpPr>
         <p:spPr>
           <a:xfrm>
-            <a:off x="4038600" y="6356350"/>
-            <a:ext cx="4114800" cy="365125"/>
+            <a:off x="1451579" y="329307"/>
+            <a:ext cx="5938836" cy="309201"/>
           </a:xfrm>
           <a:prstGeom prst="rect">
             <a:avLst/>
@@ -2550,8 +3165,8 @@
         <p:txBody>
           <a:bodyPr vert="horz" lIns="91440" tIns="45720" rIns="91440" bIns="45720" rtlCol="0" anchor="ctr"/>
           <a:lstStyle>
-            <a:lvl1pPr algn="ctr">
-              <a:defRPr sz="1200">
+            <a:lvl1pPr algn="l">
+              <a:defRPr sz="1000">
                 <a:solidFill>
                   <a:schemeClr val="tx1">
                     <a:tint val="75000"/>
@@ -2567,7 +3182,7 @@
       </p:sp>
       <p:sp>
         <p:nvSpPr>
-          <p:cNvPr id="6" name="灯片编号占位符 5"/>
+          <p:cNvPr id="6" name="Slide Number Placeholder 5"/>
           <p:cNvSpPr>
             <a:spLocks noGrp="1"/>
           </p:cNvSpPr>
@@ -2577,49 +3192,90 @@
         </p:nvSpPr>
         <p:spPr>
           <a:xfrm>
-            <a:off x="8610600" y="6356350"/>
-            <a:ext cx="2743200" cy="365125"/>
+            <a:off x="480060" y="798973"/>
+            <a:ext cx="811019" cy="503578"/>
           </a:xfrm>
           <a:prstGeom prst="rect">
             <a:avLst/>
           </a:prstGeom>
         </p:spPr>
         <p:txBody>
-          <a:bodyPr vert="horz" lIns="91440" tIns="45720" rIns="91440" bIns="45720" rtlCol="0" anchor="ctr"/>
+          <a:bodyPr vert="horz" lIns="91440" tIns="45720" rIns="91440" bIns="45720" rtlCol="0" anchor="t"/>
           <a:lstStyle>
             <a:lvl1pPr algn="r">
-              <a:defRPr sz="1200">
+              <a:defRPr sz="2800">
                 <a:solidFill>
-                  <a:schemeClr val="tx1">
-                    <a:tint val="75000"/>
-                  </a:schemeClr>
+                  <a:schemeClr val="accent1"/>
                 </a:solidFill>
               </a:defRPr>
             </a:lvl1pPr>
           </a:lstStyle>
           <a:p>
-            <a:fld id="{565CE74E-AB26-4998-AD42-012C4C1AD076}" type="slidenum">
+            <a:fld id="{FFDAE15B-D4B7-402B-A073-917161BA51E1}" type="slidenum">
               <a:rPr lang="zh-CN" altLang="en-US" smtClean="0"/>
+              <a:t>‹#›</a:t>
             </a:fld>
             <a:endParaRPr lang="zh-CN" altLang="en-US"/>
           </a:p>
         </p:txBody>
       </p:sp>
+      <p:cxnSp>
+        <p:nvCxnSpPr>
+          <p:cNvPr id="10" name="Straight Connector 9"/>
+          <p:cNvCxnSpPr/>
+          <p:nvPr/>
+        </p:nvCxnSpPr>
+        <p:spPr>
+          <a:xfrm>
+            <a:off x="0" y="6128413"/>
+            <a:ext cx="12192000" cy="0"/>
+          </a:xfrm>
+          <a:prstGeom prst="line">
+            <a:avLst/>
+          </a:prstGeom>
+          <a:ln w="12700">
+            <a:solidFill>
+              <a:srgbClr val="000001">
+                <a:alpha val="20000"/>
+              </a:srgbClr>
+            </a:solidFill>
+          </a:ln>
+        </p:spPr>
+        <p:style>
+          <a:lnRef idx="1">
+            <a:schemeClr val="accent1"/>
+          </a:lnRef>
+          <a:fillRef idx="0">
+            <a:schemeClr val="accent1"/>
+          </a:fillRef>
+          <a:effectRef idx="0">
+            <a:schemeClr val="accent1"/>
+          </a:effectRef>
+          <a:fontRef idx="minor">
+            <a:schemeClr val="tx1"/>
+          </a:fontRef>
+        </p:style>
+      </p:cxnSp>
     </p:spTree>
+    <p:extLst>
+      <p:ext uri="{BB962C8B-B14F-4D97-AF65-F5344CB8AC3E}">
+        <p14:creationId xmlns:p14="http://schemas.microsoft.com/office/powerpoint/2010/main" val="2072238654"/>
+      </p:ext>
+    </p:extLst>
   </p:cSld>
   <p:clrMap bg1="lt1" tx1="dk1" bg2="lt2" tx2="dk2" accent1="accent1" accent2="accent2" accent3="accent3" accent4="accent4" accent5="accent5" accent6="accent6" hlink="hlink" folHlink="folHlink"/>
   <p:sldLayoutIdLst>
-    <p:sldLayoutId id="2147483649" r:id="rId1"/>
-    <p:sldLayoutId id="2147483650" r:id="rId2"/>
-    <p:sldLayoutId id="2147483651" r:id="rId3"/>
-    <p:sldLayoutId id="2147483652" r:id="rId4"/>
-    <p:sldLayoutId id="2147483653" r:id="rId5"/>
-    <p:sldLayoutId id="2147483654" r:id="rId6"/>
-    <p:sldLayoutId id="2147483655" r:id="rId7"/>
-    <p:sldLayoutId id="2147483656" r:id="rId8"/>
-    <p:sldLayoutId id="2147483657" r:id="rId9"/>
-    <p:sldLayoutId id="2147483658" r:id="rId10"/>
-    <p:sldLayoutId id="2147483659" r:id="rId11"/>
+    <p:sldLayoutId id="2147483661" r:id="rId1"/>
+    <p:sldLayoutId id="2147483662" r:id="rId2"/>
+    <p:sldLayoutId id="2147483663" r:id="rId3"/>
+    <p:sldLayoutId id="2147483664" r:id="rId4"/>
+    <p:sldLayoutId id="2147483665" r:id="rId5"/>
+    <p:sldLayoutId id="2147483666" r:id="rId6"/>
+    <p:sldLayoutId id="2147483667" r:id="rId7"/>
+    <p:sldLayoutId id="2147483668" r:id="rId8"/>
+    <p:sldLayoutId id="2147483669" r:id="rId9"/>
+    <p:sldLayoutId id="2147483670" r:id="rId10"/>
+    <p:sldLayoutId id="2147483671" r:id="rId11"/>
   </p:sldLayoutIdLst>
   <p:txStyles>
     <p:titleStyle>
@@ -2631,10 +3287,11 @@
           <a:spcPct val="0"/>
         </a:spcBef>
         <a:buNone/>
-        <a:defRPr sz="4400" kern="1200">
+        <a:defRPr sz="3200" b="0" i="0" kern="1200" cap="all">
           <a:solidFill>
             <a:schemeClr val="tx1"/>
           </a:solidFill>
+          <a:effectLst/>
           <a:latin typeface="+mj-lt"/>
           <a:ea typeface="+mj-ea"/>
           <a:cs typeface="+mj-cs"/>
@@ -2644,17 +3301,22 @@
     <p:bodyStyle>
       <a:lvl1pPr marL="228600" indent="-228600" algn="l" defTabSz="914400" rtl="0" eaLnBrk="1" latinLnBrk="0" hangingPunct="1">
         <a:lnSpc>
-          <a:spcPct val="90000"/>
+          <a:spcPct val="120000"/>
         </a:lnSpc>
         <a:spcBef>
           <a:spcPts val="1000"/>
         </a:spcBef>
+        <a:buClr>
+          <a:schemeClr val="accent1"/>
+        </a:buClr>
+        <a:buSzPct val="100000"/>
         <a:buFont typeface="Arial" panose="020B0604020202020204" pitchFamily="34" charset="0"/>
         <a:buChar char="•"/>
-        <a:defRPr sz="2800" kern="1200">
+        <a:defRPr sz="2000" kern="1200">
           <a:solidFill>
             <a:schemeClr val="tx1"/>
           </a:solidFill>
+          <a:effectLst/>
           <a:latin typeface="+mn-lt"/>
           <a:ea typeface="+mn-ea"/>
           <a:cs typeface="+mn-cs"/>
@@ -2662,17 +3324,22 @@
       </a:lvl1pPr>
       <a:lvl2pPr marL="685800" indent="-228600" algn="l" defTabSz="914400" rtl="0" eaLnBrk="1" latinLnBrk="0" hangingPunct="1">
         <a:lnSpc>
-          <a:spcPct val="90000"/>
+          <a:spcPct val="120000"/>
         </a:lnSpc>
         <a:spcBef>
           <a:spcPts val="500"/>
         </a:spcBef>
+        <a:buClr>
+          <a:schemeClr val="accent1"/>
+        </a:buClr>
+        <a:buSzPct val="100000"/>
         <a:buFont typeface="Arial" panose="020B0604020202020204" pitchFamily="34" charset="0"/>
         <a:buChar char="•"/>
-        <a:defRPr sz="2400" kern="1200">
+        <a:defRPr sz="1800" kern="1200" cap="none" baseline="0">
           <a:solidFill>
             <a:schemeClr val="tx1"/>
           </a:solidFill>
+          <a:effectLst/>
           <a:latin typeface="+mn-lt"/>
           <a:ea typeface="+mn-ea"/>
           <a:cs typeface="+mn-cs"/>
@@ -2680,17 +3347,22 @@
       </a:lvl2pPr>
       <a:lvl3pPr marL="1143000" indent="-228600" algn="l" defTabSz="914400" rtl="0" eaLnBrk="1" latinLnBrk="0" hangingPunct="1">
         <a:lnSpc>
-          <a:spcPct val="90000"/>
+          <a:spcPct val="120000"/>
         </a:lnSpc>
         <a:spcBef>
           <a:spcPts val="500"/>
         </a:spcBef>
+        <a:buClr>
+          <a:schemeClr val="accent1"/>
+        </a:buClr>
+        <a:buSzPct val="100000"/>
         <a:buFont typeface="Arial" panose="020B0604020202020204" pitchFamily="34" charset="0"/>
         <a:buChar char="•"/>
-        <a:defRPr sz="2000" kern="1200">
+        <a:defRPr sz="1600" kern="1200">
           <a:solidFill>
             <a:schemeClr val="tx1"/>
           </a:solidFill>
+          <a:effectLst/>
           <a:latin typeface="+mn-lt"/>
           <a:ea typeface="+mn-ea"/>
           <a:cs typeface="+mn-cs"/>
@@ -2698,17 +3370,22 @@
       </a:lvl3pPr>
       <a:lvl4pPr marL="1600200" indent="-228600" algn="l" defTabSz="914400" rtl="0" eaLnBrk="1" latinLnBrk="0" hangingPunct="1">
         <a:lnSpc>
-          <a:spcPct val="90000"/>
+          <a:spcPct val="120000"/>
         </a:lnSpc>
         <a:spcBef>
           <a:spcPts val="500"/>
         </a:spcBef>
+        <a:buClr>
+          <a:schemeClr val="accent1"/>
+        </a:buClr>
+        <a:buSzPct val="100000"/>
         <a:buFont typeface="Arial" panose="020B0604020202020204" pitchFamily="34" charset="0"/>
         <a:buChar char="•"/>
-        <a:defRPr sz="1800" kern="1200">
+        <a:defRPr sz="1400" kern="1200" cap="none" baseline="0">
           <a:solidFill>
             <a:schemeClr val="tx1"/>
           </a:solidFill>
+          <a:effectLst/>
           <a:latin typeface="+mn-lt"/>
           <a:ea typeface="+mn-ea"/>
           <a:cs typeface="+mn-cs"/>
@@ -2716,17 +3393,22 @@
       </a:lvl4pPr>
       <a:lvl5pPr marL="2057400" indent="-228600" algn="l" defTabSz="914400" rtl="0" eaLnBrk="1" latinLnBrk="0" hangingPunct="1">
         <a:lnSpc>
-          <a:spcPct val="90000"/>
+          <a:spcPct val="120000"/>
         </a:lnSpc>
         <a:spcBef>
           <a:spcPts val="500"/>
         </a:spcBef>
+        <a:buClr>
+          <a:schemeClr val="accent1"/>
+        </a:buClr>
+        <a:buSzPct val="100000"/>
         <a:buFont typeface="Arial" panose="020B0604020202020204" pitchFamily="34" charset="0"/>
         <a:buChar char="•"/>
-        <a:defRPr sz="1800" kern="1200">
+        <a:defRPr sz="1200" kern="1200">
           <a:solidFill>
             <a:schemeClr val="tx1"/>
           </a:solidFill>
+          <a:effectLst/>
           <a:latin typeface="+mn-lt"/>
           <a:ea typeface="+mn-ea"/>
           <a:cs typeface="+mn-cs"/>
@@ -2734,17 +3416,22 @@
       </a:lvl5pPr>
       <a:lvl6pPr marL="2514600" indent="-228600" algn="l" defTabSz="914400" rtl="0" eaLnBrk="1" latinLnBrk="0" hangingPunct="1">
         <a:lnSpc>
-          <a:spcPct val="90000"/>
+          <a:spcPct val="120000"/>
         </a:lnSpc>
         <a:spcBef>
           <a:spcPts val="500"/>
         </a:spcBef>
+        <a:buClr>
+          <a:schemeClr val="accent1"/>
+        </a:buClr>
+        <a:buSzPct val="100000"/>
         <a:buFont typeface="Arial" panose="020B0604020202020204" pitchFamily="34" charset="0"/>
         <a:buChar char="•"/>
-        <a:defRPr sz="1800" kern="1200">
+        <a:defRPr sz="1200" kern="1200">
           <a:solidFill>
             <a:schemeClr val="tx1"/>
           </a:solidFill>
+          <a:effectLst/>
           <a:latin typeface="+mn-lt"/>
           <a:ea typeface="+mn-ea"/>
           <a:cs typeface="+mn-cs"/>
@@ -2752,17 +3439,22 @@
       </a:lvl6pPr>
       <a:lvl7pPr marL="2971800" indent="-228600" algn="l" defTabSz="914400" rtl="0" eaLnBrk="1" latinLnBrk="0" hangingPunct="1">
         <a:lnSpc>
-          <a:spcPct val="90000"/>
+          <a:spcPct val="120000"/>
         </a:lnSpc>
         <a:spcBef>
           <a:spcPts val="500"/>
         </a:spcBef>
+        <a:buClr>
+          <a:schemeClr val="accent1"/>
+        </a:buClr>
+        <a:buSzPct val="100000"/>
         <a:buFont typeface="Arial" panose="020B0604020202020204" pitchFamily="34" charset="0"/>
         <a:buChar char="•"/>
-        <a:defRPr sz="1800" kern="1200">
+        <a:defRPr sz="1200" kern="1200">
           <a:solidFill>
             <a:schemeClr val="tx1"/>
           </a:solidFill>
+          <a:effectLst/>
           <a:latin typeface="+mn-lt"/>
           <a:ea typeface="+mn-ea"/>
           <a:cs typeface="+mn-cs"/>
@@ -2770,17 +3462,22 @@
       </a:lvl7pPr>
       <a:lvl8pPr marL="3429000" indent="-228600" algn="l" defTabSz="914400" rtl="0" eaLnBrk="1" latinLnBrk="0" hangingPunct="1">
         <a:lnSpc>
-          <a:spcPct val="90000"/>
+          <a:spcPct val="120000"/>
         </a:lnSpc>
         <a:spcBef>
           <a:spcPts val="500"/>
         </a:spcBef>
+        <a:buClr>
+          <a:schemeClr val="accent1"/>
+        </a:buClr>
+        <a:buSzPct val="100000"/>
         <a:buFont typeface="Arial" panose="020B0604020202020204" pitchFamily="34" charset="0"/>
         <a:buChar char="•"/>
-        <a:defRPr sz="1800" kern="1200">
+        <a:defRPr sz="1200" kern="1200" baseline="0">
           <a:solidFill>
             <a:schemeClr val="tx1"/>
           </a:solidFill>
+          <a:effectLst/>
           <a:latin typeface="+mn-lt"/>
           <a:ea typeface="+mn-ea"/>
           <a:cs typeface="+mn-cs"/>
@@ -2788,17 +3485,22 @@
       </a:lvl8pPr>
       <a:lvl9pPr marL="3886200" indent="-228600" algn="l" defTabSz="914400" rtl="0" eaLnBrk="1" latinLnBrk="0" hangingPunct="1">
         <a:lnSpc>
-          <a:spcPct val="90000"/>
+          <a:spcPct val="120000"/>
         </a:lnSpc>
         <a:spcBef>
           <a:spcPts val="500"/>
         </a:spcBef>
+        <a:buClr>
+          <a:schemeClr val="accent1"/>
+        </a:buClr>
+        <a:buSzPct val="100000"/>
         <a:buFont typeface="Arial" panose="020B0604020202020204" pitchFamily="34" charset="0"/>
         <a:buChar char="•"/>
-        <a:defRPr sz="1800" kern="1200">
+        <a:defRPr sz="1200" kern="1200" baseline="0">
           <a:solidFill>
             <a:schemeClr val="tx1"/>
           </a:solidFill>
+          <a:effectLst/>
           <a:latin typeface="+mn-lt"/>
           <a:ea typeface="+mn-ea"/>
           <a:cs typeface="+mn-cs"/>
@@ -2807,7 +3509,7 @@
     </p:bodyStyle>
     <p:otherStyle>
       <a:defPPr>
-        <a:defRPr lang="zh-CN"/>
+        <a:defRPr lang="en-US"/>
       </a:defPPr>
       <a:lvl1pPr marL="0" algn="l" defTabSz="914400" rtl="0" eaLnBrk="1" latinLnBrk="0" hangingPunct="1">
         <a:defRPr sz="1800" kern="1200">
@@ -2913,10 +3615,23 @@
         <p:cNvGrpSpPr/>
         <p:nvPr/>
       </p:nvGrpSpPr>
-      <p:grpSpPr/>
-      <p:sp>
-        <p:nvSpPr>
-          <p:cNvPr id="2" name="标题 1"/>
+      <p:grpSpPr>
+        <a:xfrm>
+          <a:off x="0" y="0"/>
+          <a:ext cx="0" cy="0"/>
+          <a:chOff x="0" y="0"/>
+          <a:chExt cx="0" cy="0"/>
+        </a:xfrm>
+      </p:grpSpPr>
+      <p:sp>
+        <p:nvSpPr>
+          <p:cNvPr id="2" name="标题 1">
+            <a:extLst>
+              <a:ext uri="{FF2B5EF4-FFF2-40B4-BE49-F238E27FC236}">
+                <a16:creationId xmlns:a16="http://schemas.microsoft.com/office/drawing/2014/main" id="{6D27189C-DB97-7DEA-1250-711C49E6DB9C}"/>
+              </a:ext>
+            </a:extLst>
+          </p:cNvPr>
           <p:cNvSpPr>
             <a:spLocks noGrp="1"/>
           </p:cNvSpPr>
@@ -2927,38 +3642,191 @@
         <p:spPr/>
         <p:txBody>
           <a:bodyPr/>
-          <a:p>
+          <a:lstStyle/>
+          <a:p>
+            <a:r>
+              <a:rPr lang="zh-CN" altLang="en-US"/>
+              <a:t>相册</a:t>
+            </a:r>
+          </a:p>
+        </p:txBody>
+      </p:sp>
+      <p:sp>
+        <p:nvSpPr>
+          <p:cNvPr id="3" name="副标题 2">
+            <a:extLst>
+              <a:ext uri="{FF2B5EF4-FFF2-40B4-BE49-F238E27FC236}">
+                <a16:creationId xmlns:a16="http://schemas.microsoft.com/office/drawing/2014/main" id="{9FEAC44F-56C0-A0F3-ACD7-86D756349596}"/>
+              </a:ext>
+            </a:extLst>
+          </p:cNvPr>
+          <p:cNvSpPr>
+            <a:spLocks noGrp="1"/>
+          </p:cNvSpPr>
+          <p:nvPr>
+            <p:ph type="subTitle" idx="1"/>
+          </p:nvPr>
+        </p:nvSpPr>
+        <p:spPr/>
+        <p:txBody>
+          <a:bodyPr/>
+          <a:lstStyle/>
+          <a:p>
+            <a:r>
+              <a:rPr lang="zh-CN" altLang="en-US"/>
+              <a:t>由 </a:t>
+            </a:r>
             <a:r>
               <a:rPr lang="en-US" altLang="zh-CN"/>
-              <a:t>111</a:t>
-            </a:r>
-            <a:endParaRPr lang="en-US" altLang="zh-CN"/>
-          </a:p>
-        </p:txBody>
-      </p:sp>
-      <p:sp>
-        <p:nvSpPr>
-          <p:cNvPr id="3" name="副标题 2"/>
-          <p:cNvSpPr>
-            <a:spLocks noGrp="1"/>
-          </p:cNvSpPr>
-          <p:nvPr>
-            <p:ph type="subTitle" idx="1"/>
-          </p:nvPr>
-        </p:nvSpPr>
-        <p:spPr/>
-        <p:txBody>
-          <a:bodyPr/>
-          <a:p>
-            <a:r>
-              <a:rPr lang="en-US" altLang="zh-CN"/>
-              <a:t>222</a:t>
-            </a:r>
-            <a:endParaRPr lang="en-US" altLang="zh-CN"/>
+              <a:t>xiaoqiang wei </a:t>
+            </a:r>
+            <a:r>
+              <a:rPr lang="zh-CN" altLang="en-US"/>
+              <a:t>创建</a:t>
+            </a:r>
           </a:p>
         </p:txBody>
       </p:sp>
     </p:spTree>
+    <p:extLst>
+      <p:ext uri="{BB962C8B-B14F-4D97-AF65-F5344CB8AC3E}">
+        <p14:creationId xmlns:p14="http://schemas.microsoft.com/office/powerpoint/2010/main" val="1060834822"/>
+      </p:ext>
+    </p:extLst>
+  </p:cSld>
+  <p:clrMapOvr>
+    <a:masterClrMapping/>
+  </p:clrMapOvr>
+</p:sld>
+</file>
+
+<file path=ppt/slides/slide2.xml><?xml version="1.0" encoding="utf-8"?>
+<p:sld xmlns:a="http://schemas.openxmlformats.org/drawingml/2006/main" xmlns:r="http://schemas.openxmlformats.org/officeDocument/2006/relationships" xmlns:p="http://schemas.openxmlformats.org/presentationml/2006/main">
+  <p:cSld>
+    <p:spTree>
+      <p:nvGrpSpPr>
+        <p:cNvPr id="1" name=""/>
+        <p:cNvGrpSpPr/>
+        <p:nvPr/>
+      </p:nvGrpSpPr>
+      <p:grpSpPr>
+        <a:xfrm>
+          <a:off x="0" y="0"/>
+          <a:ext cx="0" cy="0"/>
+          <a:chOff x="0" y="0"/>
+          <a:chExt cx="0" cy="0"/>
+        </a:xfrm>
+      </p:grpSpPr>
+      <p:pic>
+        <p:nvPicPr>
+          <p:cNvPr id="3" name="图片 2" descr="1">
+            <a:extLst>
+              <a:ext uri="{FF2B5EF4-FFF2-40B4-BE49-F238E27FC236}">
+                <a16:creationId xmlns:a16="http://schemas.microsoft.com/office/drawing/2014/main" id="{00A6BF96-3119-7579-B4DB-27738CE106BD}"/>
+              </a:ext>
+            </a:extLst>
+          </p:cNvPr>
+          <p:cNvPicPr>
+            <a:picLocks noGrp="1" noChangeAspect="1"/>
+          </p:cNvPicPr>
+          <p:nvPr isPhoto="1"/>
+        </p:nvPicPr>
+        <p:blipFill>
+          <a:blip r:embed="rId2">
+            <a:lum/>
+            <a:extLst>
+              <a:ext uri="{28A0092B-C50C-407E-A947-70E740481C1C}">
+                <a14:useLocalDpi xmlns:a14="http://schemas.microsoft.com/office/drawing/2010/main" val="0"/>
+              </a:ext>
+            </a:extLst>
+          </a:blip>
+          <a:stretch>
+            <a:fillRect/>
+          </a:stretch>
+        </p:blipFill>
+        <p:spPr>
+          <a:xfrm>
+            <a:off x="2108200" y="0"/>
+            <a:ext cx="7974013" cy="6858000"/>
+          </a:xfrm>
+          <a:prstGeom prst="rect">
+            <a:avLst/>
+          </a:prstGeom>
+        </p:spPr>
+      </p:pic>
+    </p:spTree>
+    <p:extLst>
+      <p:ext uri="{BB962C8B-B14F-4D97-AF65-F5344CB8AC3E}">
+        <p14:creationId xmlns:p14="http://schemas.microsoft.com/office/powerpoint/2010/main" val="291826746"/>
+      </p:ext>
+    </p:extLst>
+  </p:cSld>
+  <p:clrMapOvr>
+    <a:masterClrMapping/>
+  </p:clrMapOvr>
+</p:sld>
+</file>
+
+<file path=ppt/slides/slide3.xml><?xml version="1.0" encoding="utf-8"?>
+<p:sld xmlns:a="http://schemas.openxmlformats.org/drawingml/2006/main" xmlns:r="http://schemas.openxmlformats.org/officeDocument/2006/relationships" xmlns:p="http://schemas.openxmlformats.org/presentationml/2006/main">
+  <p:cSld>
+    <p:spTree>
+      <p:nvGrpSpPr>
+        <p:cNvPr id="1" name=""/>
+        <p:cNvGrpSpPr/>
+        <p:nvPr/>
+      </p:nvGrpSpPr>
+      <p:grpSpPr>
+        <a:xfrm>
+          <a:off x="0" y="0"/>
+          <a:ext cx="0" cy="0"/>
+          <a:chOff x="0" y="0"/>
+          <a:chExt cx="0" cy="0"/>
+        </a:xfrm>
+      </p:grpSpPr>
+      <p:pic>
+        <p:nvPicPr>
+          <p:cNvPr id="3" name="图片 2" descr="7030B41BD3BE3AC58318708D210117BB">
+            <a:extLst>
+              <a:ext uri="{FF2B5EF4-FFF2-40B4-BE49-F238E27FC236}">
+                <a16:creationId xmlns:a16="http://schemas.microsoft.com/office/drawing/2014/main" id="{982D7206-FD97-34F5-ACF2-DB88147CAB8A}"/>
+              </a:ext>
+            </a:extLst>
+          </p:cNvPr>
+          <p:cNvPicPr>
+            <a:picLocks noGrp="1" noChangeAspect="1"/>
+          </p:cNvPicPr>
+          <p:nvPr isPhoto="1"/>
+        </p:nvPicPr>
+        <p:blipFill>
+          <a:blip r:embed="rId2">
+            <a:lum/>
+            <a:extLst>
+              <a:ext uri="{28A0092B-C50C-407E-A947-70E740481C1C}">
+                <a14:useLocalDpi xmlns:a14="http://schemas.microsoft.com/office/drawing/2010/main" val="0"/>
+              </a:ext>
+            </a:extLst>
+          </a:blip>
+          <a:stretch>
+            <a:fillRect/>
+          </a:stretch>
+        </p:blipFill>
+        <p:spPr>
+          <a:xfrm>
+            <a:off x="3009900" y="0"/>
+            <a:ext cx="6172200" cy="6858000"/>
+          </a:xfrm>
+          <a:prstGeom prst="rect">
+            <a:avLst/>
+          </a:prstGeom>
+        </p:spPr>
+      </p:pic>
+    </p:spTree>
+    <p:extLst>
+      <p:ext uri="{BB962C8B-B14F-4D97-AF65-F5344CB8AC3E}">
+        <p14:creationId xmlns:p14="http://schemas.microsoft.com/office/powerpoint/2010/main" val="3758677370"/>
+      </p:ext>
+    </p:extLst>
   </p:cSld>
   <p:clrMapOvr>
     <a:masterClrMapping/>
@@ -2967,9 +3835,9 @@
 </file>
 
 <file path=ppt/theme/theme1.xml><?xml version="1.0" encoding="utf-8"?>
-<a:theme xmlns:a="http://schemas.openxmlformats.org/drawingml/2006/main" name="WPS">
+<a:theme xmlns:a="http://schemas.openxmlformats.org/drawingml/2006/main" name="画廊">
   <a:themeElements>
-    <a:clrScheme name="WPS">
+    <a:clrScheme name="画廊">
       <a:dk1>
         <a:sysClr val="windowText" lastClr="000000"/>
       </a:dk1>
@@ -2977,44 +3845,44 @@
         <a:sysClr val="window" lastClr="FFFFFF"/>
       </a:lt1>
       <a:dk2>
-        <a:srgbClr val="44546A"/>
+        <a:srgbClr val="454545"/>
       </a:dk2>
       <a:lt2>
-        <a:srgbClr val="E7E6E6"/>
+        <a:srgbClr val="DFDBD5"/>
       </a:lt2>
       <a:accent1>
-        <a:srgbClr val="4874CB"/>
+        <a:srgbClr val="B71E42"/>
       </a:accent1>
       <a:accent2>
-        <a:srgbClr val="EE822F"/>
+        <a:srgbClr val="DE478E"/>
       </a:accent2>
       <a:accent3>
-        <a:srgbClr val="F2BA02"/>
+        <a:srgbClr val="BC72F0"/>
       </a:accent3>
       <a:accent4>
-        <a:srgbClr val="75BD42"/>
+        <a:srgbClr val="795FAF"/>
       </a:accent4>
       <a:accent5>
-        <a:srgbClr val="30C0B4"/>
+        <a:srgbClr val="586EA6"/>
       </a:accent5>
       <a:accent6>
-        <a:srgbClr val="E54C5E"/>
+        <a:srgbClr val="6892A0"/>
       </a:accent6>
       <a:hlink>
-        <a:srgbClr val="0026E5"/>
+        <a:srgbClr val="FA2B5C"/>
       </a:hlink>
       <a:folHlink>
-        <a:srgbClr val="7E1FAD"/>
+        <a:srgbClr val="BC658E"/>
       </a:folHlink>
     </a:clrScheme>
-    <a:fontScheme name="WPS">
+    <a:fontScheme name="画廊">
       <a:majorFont>
-        <a:latin typeface="Calibri"/>
+        <a:latin typeface="Gill Sans MT" panose="020B0502020104020203"/>
         <a:ea typeface=""/>
         <a:cs typeface=""/>
-        <a:font script="Jpan" typeface="ＭＳ Ｐゴシック"/>
+        <a:font script="Jpan" typeface="游ゴシック Light"/>
         <a:font script="Hang" typeface="맑은 고딕"/>
-        <a:font script="Hans" typeface="微软雅黑"/>
+        <a:font script="Hans" typeface="等线 Light"/>
         <a:font script="Hant" typeface="新細明體"/>
         <a:font script="Arab" typeface="Times New Roman"/>
         <a:font script="Hebr" typeface="Times New Roman"/>
@@ -3044,12 +3912,12 @@
         <a:font script="Geor" typeface="Sylfaen"/>
       </a:majorFont>
       <a:minorFont>
-        <a:latin typeface="Calibri"/>
+        <a:latin typeface="Gill Sans MT" panose="020B0502020104020203"/>
         <a:ea typeface=""/>
         <a:cs typeface=""/>
-        <a:font script="Jpan" typeface="ＭＳ Ｐゴシック"/>
+        <a:font script="Jpan" typeface="游ゴシック"/>
         <a:font script="Hang" typeface="맑은 고딕"/>
-        <a:font script="Hans" typeface="微软雅黑"/>
+        <a:font script="Hans" typeface="等线"/>
         <a:font script="Hant" typeface="新細明體"/>
         <a:font script="Arab" typeface="Arial"/>
         <a:font script="Hebr" typeface="Arial"/>
@@ -3079,94 +3947,105 @@
         <a:font script="Geor" typeface="Sylfaen"/>
       </a:minorFont>
     </a:fontScheme>
-    <a:fmtScheme name="WPS">
+    <a:fmtScheme name="画廊">
       <a:fillStyleLst>
         <a:solidFill>
           <a:schemeClr val="phClr"/>
         </a:solidFill>
-        <a:gradFill>
+        <a:gradFill rotWithShape="1">
           <a:gsLst>
             <a:gs pos="0">
               <a:schemeClr val="phClr">
-                <a:lumOff val="17500"/>
+                <a:tint val="54000"/>
+                <a:alpha val="100000"/>
+                <a:satMod val="105000"/>
+                <a:lumMod val="110000"/>
               </a:schemeClr>
             </a:gs>
             <a:gs pos="100000">
-              <a:schemeClr val="phClr"/>
+              <a:schemeClr val="phClr">
+                <a:tint val="78000"/>
+                <a:alpha val="92000"/>
+                <a:satMod val="109000"/>
+                <a:lumMod val="100000"/>
+              </a:schemeClr>
             </a:gs>
           </a:gsLst>
-          <a:lin ang="2700000" scaled="0"/>
+          <a:lin ang="5400000" scaled="0"/>
         </a:gradFill>
-        <a:gradFill>
+        <a:gradFill rotWithShape="1">
           <a:gsLst>
             <a:gs pos="0">
               <a:schemeClr val="phClr">
-                <a:hueOff val="-2520000"/>
+                <a:tint val="98000"/>
+                <a:satMod val="110000"/>
+                <a:lumMod val="104000"/>
+              </a:schemeClr>
+            </a:gs>
+            <a:gs pos="69000">
+              <a:schemeClr val="phClr">
+                <a:shade val="88000"/>
+                <a:satMod val="130000"/>
+                <a:lumMod val="92000"/>
               </a:schemeClr>
             </a:gs>
             <a:gs pos="100000">
-              <a:schemeClr val="phClr"/>
+              <a:schemeClr val="phClr">
+                <a:shade val="78000"/>
+                <a:satMod val="130000"/>
+                <a:lumMod val="92000"/>
+              </a:schemeClr>
             </a:gs>
           </a:gsLst>
-          <a:lin ang="2700000" scaled="0"/>
+          <a:lin ang="5400000" scaled="0"/>
         </a:gradFill>
       </a:fillStyleLst>
       <a:lnStyleLst>
-        <a:ln w="12700" cap="flat" cmpd="sng" algn="ctr">
+        <a:ln w="9525" cap="flat" cmpd="sng" algn="ctr">
           <a:solidFill>
             <a:schemeClr val="phClr"/>
           </a:solidFill>
           <a:prstDash val="solid"/>
-          <a:miter lim="800000"/>
         </a:ln>
-        <a:ln w="12700" cap="flat" cmpd="sng" algn="ctr">
+        <a:ln w="15875" cap="flat" cmpd="sng" algn="ctr">
           <a:solidFill>
             <a:schemeClr val="phClr"/>
           </a:solidFill>
           <a:prstDash val="solid"/>
-          <a:miter lim="800000"/>
         </a:ln>
-        <a:ln w="12700" cap="flat" cmpd="sng" algn="ctr">
-          <a:gradFill>
-            <a:gsLst>
-              <a:gs pos="0">
-                <a:schemeClr val="phClr">
-                  <a:hueOff val="-4200000"/>
-                </a:schemeClr>
-              </a:gs>
-              <a:gs pos="100000">
-                <a:schemeClr val="phClr"/>
-              </a:gs>
-            </a:gsLst>
-            <a:lin ang="2700000" scaled="1"/>
-          </a:gradFill>
+        <a:ln w="22225" cap="flat" cmpd="sng" algn="ctr">
+          <a:solidFill>
+            <a:schemeClr val="phClr"/>
+          </a:solidFill>
           <a:prstDash val="solid"/>
-          <a:miter lim="800000"/>
         </a:ln>
       </a:lnStyleLst>
       <a:effectStyleLst>
         <a:effectStyle>
-          <a:effectLst>
-            <a:outerShdw blurRad="101600" dist="50800" dir="5400000" algn="ctr" rotWithShape="0">
-              <a:schemeClr val="phClr">
-                <a:alpha val="60000"/>
-              </a:schemeClr>
-            </a:outerShdw>
-          </a:effectLst>
+          <a:effectLst/>
+        </a:effectStyle>
+        <a:effectStyle>
+          <a:effectLst/>
         </a:effectStyle>
         <a:effectStyle>
           <a:effectLst>
-            <a:reflection stA="50000" endA="300" endPos="40000" dist="25400" dir="5400000" sy="-100000" algn="bl" rotWithShape="0"/>
-          </a:effectLst>
-        </a:effectStyle>
-        <a:effectStyle>
-          <a:effectLst>
-            <a:outerShdw blurRad="57150" dist="19050" dir="5400000" algn="ctr" rotWithShape="0">
+            <a:outerShdw blurRad="50800" dist="50800" dir="5400000" sx="96000" sy="96000" rotWithShape="0">
               <a:srgbClr val="000000">
-                <a:alpha val="63000"/>
+                <a:alpha val="48000"/>
               </a:srgbClr>
             </a:outerShdw>
           </a:effectLst>
+          <a:scene3d>
+            <a:camera prst="orthographicFront">
+              <a:rot lat="0" lon="0" rev="0"/>
+            </a:camera>
+            <a:lightRig rig="balanced" dir="t">
+              <a:rot lat="0" lon="0" rev="1080000"/>
+            </a:lightRig>
+          </a:scene3d>
+          <a:sp3d>
+            <a:bevelT w="38100" h="12700" prst="softRound"/>
+          </a:sp3d>
         </a:effectStyle>
       </a:effectStyleLst>
       <a:bgFillStyleLst>
@@ -3174,44 +4053,35 @@
           <a:schemeClr val="phClr"/>
         </a:solidFill>
         <a:solidFill>
-          <a:schemeClr val="phClr">
-            <a:tint val="95000"/>
-            <a:satMod val="170000"/>
-          </a:schemeClr>
+          <a:schemeClr val="phClr"/>
         </a:solidFill>
         <a:gradFill rotWithShape="1">
           <a:gsLst>
             <a:gs pos="0">
               <a:schemeClr val="phClr">
-                <a:tint val="93000"/>
-                <a:satMod val="150000"/>
-                <a:shade val="98000"/>
-                <a:lumMod val="102000"/>
-              </a:schemeClr>
-            </a:gs>
-            <a:gs pos="50000">
-              <a:schemeClr val="phClr">
-                <a:tint val="98000"/>
-                <a:satMod val="130000"/>
-                <a:shade val="90000"/>
-                <a:lumMod val="103000"/>
+                <a:tint val="94000"/>
+                <a:satMod val="80000"/>
+                <a:lumMod val="106000"/>
               </a:schemeClr>
             </a:gs>
             <a:gs pos="100000">
               <a:schemeClr val="phClr">
-                <a:shade val="63000"/>
-                <a:satMod val="120000"/>
+                <a:shade val="80000"/>
               </a:schemeClr>
             </a:gs>
           </a:gsLst>
-          <a:lin ang="5400000" scaled="0"/>
+          <a:path path="circle">
+            <a:fillToRect l="43000" r="43000" b="100000"/>
+          </a:path>
         </a:gradFill>
       </a:bgFillStyleLst>
     </a:fmtScheme>
   </a:themeElements>
+  <a:objectDefaults/>
+  <a:extraClrSchemeLst/>
   <a:extLst>
     <a:ext uri="{05A4C25C-085E-4340-85A3-A5531E510DB2}">
-      <thm15:themeFamily xmlns:thm15="http://schemas.microsoft.com/office/thememl/2012/main" name="Office Theme" id="{62F939B6-93AF-4DB8-9C6B-D6C7DFDC589F}" vid="{4A3C46E8-61CC-4603-A589-7422A47A8E4A}"/>
+      <thm15:themeFamily xmlns:thm15="http://schemas.microsoft.com/office/thememl/2012/main" name="Gallery" id="{BBFCD31E-59A1-489D-B089-A3EAD7CAE12E}" vid="{F5E91637-A7B6-4E27-B710-77DA7014EE1E}"/>
     </a:ext>
   </a:extLst>
 </a:theme>

</xml_diff>